<commit_message>
update day 1 content
</commit_message>
<xml_diff>
--- a/day_1/day_1.pptx
+++ b/day_1/day_1.pptx
@@ -16,14 +16,16 @@
     <p:sldId id="271" r:id="rId10"/>
     <p:sldId id="269" r:id="rId11"/>
     <p:sldId id="270" r:id="rId12"/>
-    <p:sldId id="273" r:id="rId13"/>
-    <p:sldId id="274" r:id="rId14"/>
-    <p:sldId id="275" r:id="rId15"/>
-    <p:sldId id="278" r:id="rId16"/>
-    <p:sldId id="277" r:id="rId17"/>
-    <p:sldId id="280" r:id="rId18"/>
-    <p:sldId id="261" r:id="rId19"/>
-    <p:sldId id="263" r:id="rId20"/>
+    <p:sldId id="284" r:id="rId13"/>
+    <p:sldId id="273" r:id="rId14"/>
+    <p:sldId id="274" r:id="rId15"/>
+    <p:sldId id="275" r:id="rId16"/>
+    <p:sldId id="282" r:id="rId17"/>
+    <p:sldId id="285" r:id="rId18"/>
+    <p:sldId id="278" r:id="rId19"/>
+    <p:sldId id="277" r:id="rId20"/>
+    <p:sldId id="280" r:id="rId21"/>
+    <p:sldId id="287" r:id="rId22"/>
   </p:sldIdLst>
   <p:sldSz cx="12192000" cy="6858000"/>
   <p:notesSz cx="6858000" cy="9144000"/>
@@ -277,7 +279,7 @@
           <a:p>
             <a:fld id="{B379E729-857E-4B18-8CDF-E57BD210DF26}" type="datetimeFigureOut">
               <a:rPr lang="en-US" smtClean="0"/>
-              <a:t>10/12/23</a:t>
+              <a:t>10/22/23</a:t>
             </a:fld>
             <a:endParaRPr lang="en-US"/>
           </a:p>
@@ -475,7 +477,7 @@
           <a:p>
             <a:fld id="{B379E729-857E-4B18-8CDF-E57BD210DF26}" type="datetimeFigureOut">
               <a:rPr lang="en-US" smtClean="0"/>
-              <a:t>10/12/23</a:t>
+              <a:t>10/22/23</a:t>
             </a:fld>
             <a:endParaRPr lang="en-US"/>
           </a:p>
@@ -683,7 +685,7 @@
           <a:p>
             <a:fld id="{B379E729-857E-4B18-8CDF-E57BD210DF26}" type="datetimeFigureOut">
               <a:rPr lang="en-US" smtClean="0"/>
-              <a:t>10/12/23</a:t>
+              <a:t>10/22/23</a:t>
             </a:fld>
             <a:endParaRPr lang="en-US"/>
           </a:p>
@@ -881,7 +883,7 @@
           <a:p>
             <a:fld id="{B379E729-857E-4B18-8CDF-E57BD210DF26}" type="datetimeFigureOut">
               <a:rPr lang="en-US" smtClean="0"/>
-              <a:t>10/12/23</a:t>
+              <a:t>10/22/23</a:t>
             </a:fld>
             <a:endParaRPr lang="en-US"/>
           </a:p>
@@ -1156,7 +1158,7 @@
           <a:p>
             <a:fld id="{B379E729-857E-4B18-8CDF-E57BD210DF26}" type="datetimeFigureOut">
               <a:rPr lang="en-US" smtClean="0"/>
-              <a:t>10/12/23</a:t>
+              <a:t>10/22/23</a:t>
             </a:fld>
             <a:endParaRPr lang="en-US"/>
           </a:p>
@@ -1421,7 +1423,7 @@
           <a:p>
             <a:fld id="{B379E729-857E-4B18-8CDF-E57BD210DF26}" type="datetimeFigureOut">
               <a:rPr lang="en-US" smtClean="0"/>
-              <a:t>10/12/23</a:t>
+              <a:t>10/22/23</a:t>
             </a:fld>
             <a:endParaRPr lang="en-US"/>
           </a:p>
@@ -1833,7 +1835,7 @@
           <a:p>
             <a:fld id="{B379E729-857E-4B18-8CDF-E57BD210DF26}" type="datetimeFigureOut">
               <a:rPr lang="en-US" smtClean="0"/>
-              <a:t>10/12/23</a:t>
+              <a:t>10/22/23</a:t>
             </a:fld>
             <a:endParaRPr lang="en-US"/>
           </a:p>
@@ -1974,7 +1976,7 @@
           <a:p>
             <a:fld id="{B379E729-857E-4B18-8CDF-E57BD210DF26}" type="datetimeFigureOut">
               <a:rPr lang="en-US" smtClean="0"/>
-              <a:t>10/12/23</a:t>
+              <a:t>10/22/23</a:t>
             </a:fld>
             <a:endParaRPr lang="en-US"/>
           </a:p>
@@ -2087,7 +2089,7 @@
           <a:p>
             <a:fld id="{B379E729-857E-4B18-8CDF-E57BD210DF26}" type="datetimeFigureOut">
               <a:rPr lang="en-US" smtClean="0"/>
-              <a:t>10/12/23</a:t>
+              <a:t>10/22/23</a:t>
             </a:fld>
             <a:endParaRPr lang="en-US"/>
           </a:p>
@@ -2398,7 +2400,7 @@
           <a:p>
             <a:fld id="{B379E729-857E-4B18-8CDF-E57BD210DF26}" type="datetimeFigureOut">
               <a:rPr lang="en-US" smtClean="0"/>
-              <a:t>10/12/23</a:t>
+              <a:t>10/22/23</a:t>
             </a:fld>
             <a:endParaRPr lang="en-US"/>
           </a:p>
@@ -2686,7 +2688,7 @@
           <a:p>
             <a:fld id="{B379E729-857E-4B18-8CDF-E57BD210DF26}" type="datetimeFigureOut">
               <a:rPr lang="en-US" smtClean="0"/>
-              <a:t>10/12/23</a:t>
+              <a:t>10/22/23</a:t>
             </a:fld>
             <a:endParaRPr lang="en-US"/>
           </a:p>
@@ -2927,7 +2929,7 @@
           <a:p>
             <a:fld id="{B379E729-857E-4B18-8CDF-E57BD210DF26}" type="datetimeFigureOut">
               <a:rPr lang="en-US" smtClean="0"/>
-              <a:t>10/12/23</a:t>
+              <a:t>10/22/23</a:t>
             </a:fld>
             <a:endParaRPr lang="en-US"/>
           </a:p>
@@ -3426,7 +3428,7 @@
           <a:p>
             <a:r>
               <a:rPr lang="en-US" sz="3600" dirty="0"/>
-              <a:t>10/23/2023</a:t>
+              <a:t>10/24/2023</a:t>
             </a:r>
           </a:p>
           <a:p>
@@ -3528,13 +3530,13 @@
         </p:nvSpPr>
         <p:spPr>
           <a:xfrm>
-            <a:off x="838200" y="1825625"/>
-            <a:ext cx="10048875" cy="4351338"/>
+            <a:off x="838200" y="1825624"/>
+            <a:ext cx="10048875" cy="4894489"/>
           </a:xfrm>
         </p:spPr>
         <p:txBody>
           <a:bodyPr>
-            <a:normAutofit lnSpcReduction="10000"/>
+            <a:normAutofit fontScale="77500" lnSpcReduction="20000"/>
           </a:bodyPr>
           <a:lstStyle/>
           <a:p>
@@ -3589,18 +3591,27 @@
             <a:pPr marL="0" indent="0">
               <a:buNone/>
             </a:pPr>
-            <a:r>
-              <a:rPr lang="en-US" dirty="0"/>
-              <a:t>Note: Don’t install in a path containing “space”:</a:t>
-            </a:r>
+            <a:endParaRPr lang="en-US" dirty="0"/>
           </a:p>
           <a:p>
             <a:pPr marL="0" indent="0">
               <a:buNone/>
             </a:pPr>
-            <a:r>
-              <a:rPr lang="en-US" dirty="0"/>
-              <a:t>C:\Program Files\</a:t>
+            <a:endParaRPr lang="en-US" dirty="0"/>
+          </a:p>
+          <a:p>
+            <a:pPr marL="0" indent="0">
+              <a:buNone/>
+            </a:pPr>
+            <a:endParaRPr lang="en-US" dirty="0"/>
+          </a:p>
+          <a:p>
+            <a:pPr marL="0" indent="0">
+              <a:buNone/>
+            </a:pPr>
+            <a:r>
+              <a:rPr lang="en-US" dirty="0"/>
+              <a:t>Note 1: Remember the path you installed the </a:t>
             </a:r>
             <a:r>
               <a:rPr lang="en-US" dirty="0" err="1"/>
@@ -3608,6 +3619,23 @@
             </a:r>
             <a:r>
               <a:rPr lang="en-US" dirty="0"/>
+              <a:t> (we will need it later)</a:t>
+            </a:r>
+          </a:p>
+          <a:p>
+            <a:pPr marL="0" indent="0">
+              <a:buNone/>
+            </a:pPr>
+            <a:r>
+              <a:rPr lang="en-US" dirty="0"/>
+              <a:t>Note 2: Don’t install in a path containing “space”: C:\Program Files\</a:t>
+            </a:r>
+            <a:r>
+              <a:rPr lang="en-US" dirty="0" err="1"/>
+              <a:t>miniconda</a:t>
+            </a:r>
+            <a:r>
+              <a:rPr lang="en-US" dirty="0"/>
               <a:t> </a:t>
             </a:r>
             <a:r>
@@ -3616,8 +3644,22 @@
                   <a:srgbClr val="FF0000"/>
                 </a:solidFill>
               </a:rPr>
-              <a:t>✕ ✕ ✕ ✕</a:t>
-            </a:r>
+              <a:t>✕ ✕ ✕</a:t>
+            </a:r>
+          </a:p>
+          <a:p>
+            <a:pPr marL="0" indent="0">
+              <a:buNone/>
+            </a:pPr>
+            <a:r>
+              <a:rPr lang="en-US" dirty="0"/>
+              <a:t>Note 3: It does not matter if we have multiple pythons installed on the computer</a:t>
+            </a:r>
+            <a:endParaRPr lang="en-US" dirty="0">
+              <a:solidFill>
+                <a:srgbClr val="FF0000"/>
+              </a:solidFill>
+            </a:endParaRPr>
           </a:p>
         </p:txBody>
       </p:sp>
@@ -3649,8 +3691,8 @@
         </p:blipFill>
         <p:spPr>
           <a:xfrm>
-            <a:off x="1046574" y="2343151"/>
-            <a:ext cx="7016772" cy="2711322"/>
+            <a:off x="2001157" y="2230280"/>
+            <a:ext cx="8189686" cy="3164543"/>
           </a:xfrm>
           <a:prstGeom prst="rect">
             <a:avLst/>
@@ -3742,7 +3784,7 @@
         <p:spPr/>
         <p:txBody>
           <a:bodyPr>
-            <a:normAutofit fontScale="70000" lnSpcReduction="20000"/>
+            <a:normAutofit fontScale="85000" lnSpcReduction="20000"/>
           </a:bodyPr>
           <a:lstStyle/>
           <a:p>
@@ -3843,14 +3885,17 @@
               </a:rPr>
               <a:t>/home/&lt;username&gt;/anaconda3</a:t>
             </a:r>
-          </a:p>
-          <a:p>
             <a:endParaRPr lang="en-US" dirty="0"/>
           </a:p>
           <a:p>
-            <a:r>
-              <a:rPr lang="en-US" dirty="0"/>
-              <a:t>Find from command line/terminal:</a:t>
+            <a:pPr>
+              <a:lnSpc>
+                <a:spcPct val="120000"/>
+              </a:lnSpc>
+            </a:pPr>
+            <a:r>
+              <a:rPr lang="en-US" dirty="0"/>
+              <a:t>Find python executable (from command line/terminal):</a:t>
             </a:r>
           </a:p>
           <a:p>
@@ -3900,17 +3945,11 @@
             </a:r>
           </a:p>
           <a:p>
-            <a:endParaRPr lang="en-US" dirty="0">
-              <a:solidFill>
-                <a:schemeClr val="bg1">
-                  <a:lumMod val="65000"/>
-                </a:schemeClr>
-              </a:solidFill>
-              <a:latin typeface="Consolas" panose="020B0609020204030204" pitchFamily="49" charset="0"/>
-              <a:cs typeface="Consolas" panose="020B0609020204030204" pitchFamily="49" charset="0"/>
-            </a:endParaRPr>
-          </a:p>
-          <a:p>
+            <a:pPr>
+              <a:lnSpc>
+                <a:spcPct val="120000"/>
+              </a:lnSpc>
+            </a:pPr>
             <a:r>
               <a:rPr lang="en-US" dirty="0"/>
               <a:t>Initialize </a:t>
@@ -3921,7 +3960,7 @@
             </a:r>
             <a:r>
               <a:rPr lang="en-US" dirty="0"/>
-              <a:t>:</a:t>
+              <a:t> (from command line/terminal):</a:t>
             </a:r>
           </a:p>
           <a:p>
@@ -4232,6 +4271,307 @@
 </file>
 
 <file path=ppt/slides/slide12.xml><?xml version="1.0" encoding="utf-8"?>
+<p:sld xmlns:a="http://schemas.openxmlformats.org/drawingml/2006/main" xmlns:r="http://schemas.openxmlformats.org/officeDocument/2006/relationships" xmlns:p="http://schemas.openxmlformats.org/presentationml/2006/main">
+  <p:cSld>
+    <p:spTree>
+      <p:nvGrpSpPr>
+        <p:cNvPr id="1" name=""/>
+        <p:cNvGrpSpPr/>
+        <p:nvPr/>
+      </p:nvGrpSpPr>
+      <p:grpSpPr>
+        <a:xfrm>
+          <a:off x="0" y="0"/>
+          <a:ext cx="0" cy="0"/>
+          <a:chOff x="0" y="0"/>
+          <a:chExt cx="0" cy="0"/>
+        </a:xfrm>
+      </p:grpSpPr>
+      <p:sp>
+        <p:nvSpPr>
+          <p:cNvPr id="2" name="Title 1">
+            <a:extLst>
+              <a:ext uri="{FF2B5EF4-FFF2-40B4-BE49-F238E27FC236}">
+                <a16:creationId xmlns:a16="http://schemas.microsoft.com/office/drawing/2014/main" id="{C54DE36A-8036-1E6E-6118-8AAB329666E5}"/>
+              </a:ext>
+            </a:extLst>
+          </p:cNvPr>
+          <p:cNvSpPr>
+            <a:spLocks noGrp="1"/>
+          </p:cNvSpPr>
+          <p:nvPr>
+            <p:ph type="title"/>
+          </p:nvPr>
+        </p:nvSpPr>
+        <p:spPr/>
+        <p:txBody>
+          <a:bodyPr>
+            <a:normAutofit/>
+          </a:bodyPr>
+          <a:lstStyle/>
+          <a:p>
+            <a:r>
+              <a:rPr lang="en-US" dirty="0"/>
+              <a:t>Installing Python:</a:t>
+            </a:r>
+            <a:br>
+              <a:rPr lang="en-US" dirty="0"/>
+            </a:br>
+            <a:r>
+              <a:rPr lang="en-US" sz="4000" dirty="0"/>
+              <a:t>Installing </a:t>
+            </a:r>
+            <a:r>
+              <a:rPr lang="en-US" sz="4000" dirty="0" err="1"/>
+              <a:t>miniconda</a:t>
+            </a:r>
+            <a:endParaRPr lang="en-US" dirty="0"/>
+          </a:p>
+        </p:txBody>
+      </p:sp>
+      <p:sp>
+        <p:nvSpPr>
+          <p:cNvPr id="3" name="Content Placeholder 2">
+            <a:extLst>
+              <a:ext uri="{FF2B5EF4-FFF2-40B4-BE49-F238E27FC236}">
+                <a16:creationId xmlns:a16="http://schemas.microsoft.com/office/drawing/2014/main" id="{B896F93E-986A-ADD9-B1C2-3E17CA8670C7}"/>
+              </a:ext>
+            </a:extLst>
+          </p:cNvPr>
+          <p:cNvSpPr>
+            <a:spLocks noGrp="1"/>
+          </p:cNvSpPr>
+          <p:nvPr>
+            <p:ph idx="1"/>
+          </p:nvPr>
+        </p:nvSpPr>
+        <p:spPr/>
+        <p:txBody>
+          <a:bodyPr/>
+          <a:lstStyle/>
+          <a:p>
+            <a:endParaRPr lang="en-US" dirty="0"/>
+          </a:p>
+        </p:txBody>
+      </p:sp>
+      <p:sp>
+        <p:nvSpPr>
+          <p:cNvPr id="4" name="Content Placeholder 2">
+            <a:extLst>
+              <a:ext uri="{FF2B5EF4-FFF2-40B4-BE49-F238E27FC236}">
+                <a16:creationId xmlns:a16="http://schemas.microsoft.com/office/drawing/2014/main" id="{A14BC6AA-D85D-1D20-B90D-CA59390AF393}"/>
+              </a:ext>
+            </a:extLst>
+          </p:cNvPr>
+          <p:cNvSpPr txBox="1">
+            <a:spLocks/>
+          </p:cNvSpPr>
+          <p:nvPr/>
+        </p:nvSpPr>
+        <p:spPr>
+          <a:xfrm>
+            <a:off x="695696" y="2546927"/>
+            <a:ext cx="10515600" cy="2477799"/>
+          </a:xfrm>
+          <a:prstGeom prst="rect">
+            <a:avLst/>
+          </a:prstGeom>
+        </p:spPr>
+        <p:txBody>
+          <a:bodyPr vert="horz" lIns="91440" tIns="45720" rIns="91440" bIns="45720" rtlCol="0">
+            <a:normAutofit/>
+          </a:bodyPr>
+          <a:lstStyle>
+            <a:lvl1pPr marL="228600" indent="-228600" algn="l" defTabSz="914400" rtl="0" eaLnBrk="1" latinLnBrk="0" hangingPunct="1">
+              <a:lnSpc>
+                <a:spcPct val="90000"/>
+              </a:lnSpc>
+              <a:spcBef>
+                <a:spcPts val="1000"/>
+              </a:spcBef>
+              <a:buFont typeface="Arial" panose="020B0604020202020204" pitchFamily="34" charset="0"/>
+              <a:buChar char="•"/>
+              <a:defRPr sz="2800" kern="1200">
+                <a:solidFill>
+                  <a:schemeClr val="tx1"/>
+                </a:solidFill>
+                <a:latin typeface="+mn-lt"/>
+                <a:ea typeface="+mn-ea"/>
+                <a:cs typeface="+mn-cs"/>
+              </a:defRPr>
+            </a:lvl1pPr>
+            <a:lvl2pPr marL="685800" indent="-228600" algn="l" defTabSz="914400" rtl="0" eaLnBrk="1" latinLnBrk="0" hangingPunct="1">
+              <a:lnSpc>
+                <a:spcPct val="90000"/>
+              </a:lnSpc>
+              <a:spcBef>
+                <a:spcPts val="500"/>
+              </a:spcBef>
+              <a:buFont typeface="Arial" panose="020B0604020202020204" pitchFamily="34" charset="0"/>
+              <a:buChar char="•"/>
+              <a:defRPr sz="2400" kern="1200">
+                <a:solidFill>
+                  <a:schemeClr val="tx1"/>
+                </a:solidFill>
+                <a:latin typeface="+mn-lt"/>
+                <a:ea typeface="+mn-ea"/>
+                <a:cs typeface="+mn-cs"/>
+              </a:defRPr>
+            </a:lvl2pPr>
+            <a:lvl3pPr marL="1143000" indent="-228600" algn="l" defTabSz="914400" rtl="0" eaLnBrk="1" latinLnBrk="0" hangingPunct="1">
+              <a:lnSpc>
+                <a:spcPct val="90000"/>
+              </a:lnSpc>
+              <a:spcBef>
+                <a:spcPts val="500"/>
+              </a:spcBef>
+              <a:buFont typeface="Arial" panose="020B0604020202020204" pitchFamily="34" charset="0"/>
+              <a:buChar char="•"/>
+              <a:defRPr sz="2000" kern="1200">
+                <a:solidFill>
+                  <a:schemeClr val="tx1"/>
+                </a:solidFill>
+                <a:latin typeface="+mn-lt"/>
+                <a:ea typeface="+mn-ea"/>
+                <a:cs typeface="+mn-cs"/>
+              </a:defRPr>
+            </a:lvl3pPr>
+            <a:lvl4pPr marL="1600200" indent="-228600" algn="l" defTabSz="914400" rtl="0" eaLnBrk="1" latinLnBrk="0" hangingPunct="1">
+              <a:lnSpc>
+                <a:spcPct val="90000"/>
+              </a:lnSpc>
+              <a:spcBef>
+                <a:spcPts val="500"/>
+              </a:spcBef>
+              <a:buFont typeface="Arial" panose="020B0604020202020204" pitchFamily="34" charset="0"/>
+              <a:buChar char="•"/>
+              <a:defRPr sz="1800" kern="1200">
+                <a:solidFill>
+                  <a:schemeClr val="tx1"/>
+                </a:solidFill>
+                <a:latin typeface="+mn-lt"/>
+                <a:ea typeface="+mn-ea"/>
+                <a:cs typeface="+mn-cs"/>
+              </a:defRPr>
+            </a:lvl4pPr>
+            <a:lvl5pPr marL="2057400" indent="-228600" algn="l" defTabSz="914400" rtl="0" eaLnBrk="1" latinLnBrk="0" hangingPunct="1">
+              <a:lnSpc>
+                <a:spcPct val="90000"/>
+              </a:lnSpc>
+              <a:spcBef>
+                <a:spcPts val="500"/>
+              </a:spcBef>
+              <a:buFont typeface="Arial" panose="020B0604020202020204" pitchFamily="34" charset="0"/>
+              <a:buChar char="•"/>
+              <a:defRPr sz="1800" kern="1200">
+                <a:solidFill>
+                  <a:schemeClr val="tx1"/>
+                </a:solidFill>
+                <a:latin typeface="+mn-lt"/>
+                <a:ea typeface="+mn-ea"/>
+                <a:cs typeface="+mn-cs"/>
+              </a:defRPr>
+            </a:lvl5pPr>
+            <a:lvl6pPr marL="2514600" indent="-228600" algn="l" defTabSz="914400" rtl="0" eaLnBrk="1" latinLnBrk="0" hangingPunct="1">
+              <a:lnSpc>
+                <a:spcPct val="90000"/>
+              </a:lnSpc>
+              <a:spcBef>
+                <a:spcPts val="500"/>
+              </a:spcBef>
+              <a:buFont typeface="Arial" panose="020B0604020202020204" pitchFamily="34" charset="0"/>
+              <a:buChar char="•"/>
+              <a:defRPr sz="1800" kern="1200">
+                <a:solidFill>
+                  <a:schemeClr val="tx1"/>
+                </a:solidFill>
+                <a:latin typeface="+mn-lt"/>
+                <a:ea typeface="+mn-ea"/>
+                <a:cs typeface="+mn-cs"/>
+              </a:defRPr>
+            </a:lvl6pPr>
+            <a:lvl7pPr marL="2971800" indent="-228600" algn="l" defTabSz="914400" rtl="0" eaLnBrk="1" latinLnBrk="0" hangingPunct="1">
+              <a:lnSpc>
+                <a:spcPct val="90000"/>
+              </a:lnSpc>
+              <a:spcBef>
+                <a:spcPts val="500"/>
+              </a:spcBef>
+              <a:buFont typeface="Arial" panose="020B0604020202020204" pitchFamily="34" charset="0"/>
+              <a:buChar char="•"/>
+              <a:defRPr sz="1800" kern="1200">
+                <a:solidFill>
+                  <a:schemeClr val="tx1"/>
+                </a:solidFill>
+                <a:latin typeface="+mn-lt"/>
+                <a:ea typeface="+mn-ea"/>
+                <a:cs typeface="+mn-cs"/>
+              </a:defRPr>
+            </a:lvl7pPr>
+            <a:lvl8pPr marL="3429000" indent="-228600" algn="l" defTabSz="914400" rtl="0" eaLnBrk="1" latinLnBrk="0" hangingPunct="1">
+              <a:lnSpc>
+                <a:spcPct val="90000"/>
+              </a:lnSpc>
+              <a:spcBef>
+                <a:spcPts val="500"/>
+              </a:spcBef>
+              <a:buFont typeface="Arial" panose="020B0604020202020204" pitchFamily="34" charset="0"/>
+              <a:buChar char="•"/>
+              <a:defRPr sz="1800" kern="1200">
+                <a:solidFill>
+                  <a:schemeClr val="tx1"/>
+                </a:solidFill>
+                <a:latin typeface="+mn-lt"/>
+                <a:ea typeface="+mn-ea"/>
+                <a:cs typeface="+mn-cs"/>
+              </a:defRPr>
+            </a:lvl8pPr>
+            <a:lvl9pPr marL="3886200" indent="-228600" algn="l" defTabSz="914400" rtl="0" eaLnBrk="1" latinLnBrk="0" hangingPunct="1">
+              <a:lnSpc>
+                <a:spcPct val="90000"/>
+              </a:lnSpc>
+              <a:spcBef>
+                <a:spcPts val="500"/>
+              </a:spcBef>
+              <a:buFont typeface="Arial" panose="020B0604020202020204" pitchFamily="34" charset="0"/>
+              <a:buChar char="•"/>
+              <a:defRPr sz="1800" kern="1200">
+                <a:solidFill>
+                  <a:schemeClr val="tx1"/>
+                </a:solidFill>
+                <a:latin typeface="+mn-lt"/>
+                <a:ea typeface="+mn-ea"/>
+                <a:cs typeface="+mn-cs"/>
+              </a:defRPr>
+            </a:lvl9pPr>
+          </a:lstStyle>
+          <a:p>
+            <a:pPr marL="0" indent="0" algn="ctr">
+              <a:buFont typeface="Arial" panose="020B0604020202020204" pitchFamily="34" charset="0"/>
+              <a:buNone/>
+            </a:pPr>
+            <a:r>
+              <a:rPr lang="en-US" sz="16600"/>
+              <a:t>DEMO</a:t>
+            </a:r>
+            <a:endParaRPr lang="en-US" sz="16600" dirty="0"/>
+          </a:p>
+        </p:txBody>
+      </p:sp>
+    </p:spTree>
+    <p:extLst>
+      <p:ext uri="{BB962C8B-B14F-4D97-AF65-F5344CB8AC3E}">
+        <p14:creationId xmlns:p14="http://schemas.microsoft.com/office/powerpoint/2010/main" val="1837509275"/>
+      </p:ext>
+    </p:extLst>
+  </p:cSld>
+  <p:clrMapOvr>
+    <a:masterClrMapping/>
+  </p:clrMapOvr>
+</p:sld>
+</file>
+
+<file path=ppt/slides/slide13.xml><?xml version="1.0" encoding="utf-8"?>
 <p:sld xmlns:a="http://schemas.openxmlformats.org/drawingml/2006/main" xmlns:r="http://schemas.openxmlformats.org/officeDocument/2006/relationships" xmlns:p="http://schemas.openxmlformats.org/presentationml/2006/main">
   <p:cSld>
     <p:spTree>
@@ -4757,7 +5097,7 @@
 </p:sld>
 </file>
 
-<file path=ppt/slides/slide13.xml><?xml version="1.0" encoding="utf-8"?>
+<file path=ppt/slides/slide14.xml><?xml version="1.0" encoding="utf-8"?>
 <p:sld xmlns:a="http://schemas.openxmlformats.org/drawingml/2006/main" xmlns:r="http://schemas.openxmlformats.org/officeDocument/2006/relationships" xmlns:p="http://schemas.openxmlformats.org/presentationml/2006/main">
   <p:cSld>
     <p:spTree>
@@ -4896,7 +5236,7 @@
 </p:sld>
 </file>
 
-<file path=ppt/slides/slide14.xml><?xml version="1.0" encoding="utf-8"?>
+<file path=ppt/slides/slide15.xml><?xml version="1.0" encoding="utf-8"?>
 <p:sld xmlns:a="http://schemas.openxmlformats.org/drawingml/2006/main" xmlns:r="http://schemas.openxmlformats.org/officeDocument/2006/relationships" xmlns:p="http://schemas.openxmlformats.org/presentationml/2006/main">
   <p:cSld>
     <p:bg>
@@ -5364,293 +5704,6 @@
 </p:sld>
 </file>
 
-<file path=ppt/slides/slide15.xml><?xml version="1.0" encoding="utf-8"?>
-<p:sld xmlns:a="http://schemas.openxmlformats.org/drawingml/2006/main" xmlns:r="http://schemas.openxmlformats.org/officeDocument/2006/relationships" xmlns:p="http://schemas.openxmlformats.org/presentationml/2006/main">
-  <p:cSld>
-    <p:spTree>
-      <p:nvGrpSpPr>
-        <p:cNvPr id="1" name=""/>
-        <p:cNvGrpSpPr/>
-        <p:nvPr/>
-      </p:nvGrpSpPr>
-      <p:grpSpPr>
-        <a:xfrm>
-          <a:off x="0" y="0"/>
-          <a:ext cx="0" cy="0"/>
-          <a:chOff x="0" y="0"/>
-          <a:chExt cx="0" cy="0"/>
-        </a:xfrm>
-      </p:grpSpPr>
-      <p:sp>
-        <p:nvSpPr>
-          <p:cNvPr id="2" name="Title 1">
-            <a:extLst>
-              <a:ext uri="{FF2B5EF4-FFF2-40B4-BE49-F238E27FC236}">
-                <a16:creationId xmlns:a16="http://schemas.microsoft.com/office/drawing/2014/main" id="{C54DE36A-8036-1E6E-6118-8AAB329666E5}"/>
-              </a:ext>
-            </a:extLst>
-          </p:cNvPr>
-          <p:cNvSpPr>
-            <a:spLocks noGrp="1"/>
-          </p:cNvSpPr>
-          <p:nvPr>
-            <p:ph type="title"/>
-          </p:nvPr>
-        </p:nvSpPr>
-        <p:spPr/>
-        <p:txBody>
-          <a:bodyPr/>
-          <a:lstStyle/>
-          <a:p>
-            <a:r>
-              <a:rPr lang="en-US" dirty="0"/>
-              <a:t>Python Basics</a:t>
-            </a:r>
-          </a:p>
-        </p:txBody>
-      </p:sp>
-      <p:sp>
-        <p:nvSpPr>
-          <p:cNvPr id="3" name="Content Placeholder 2">
-            <a:extLst>
-              <a:ext uri="{FF2B5EF4-FFF2-40B4-BE49-F238E27FC236}">
-                <a16:creationId xmlns:a16="http://schemas.microsoft.com/office/drawing/2014/main" id="{B896F93E-986A-ADD9-B1C2-3E17CA8670C7}"/>
-              </a:ext>
-            </a:extLst>
-          </p:cNvPr>
-          <p:cNvSpPr>
-            <a:spLocks noGrp="1"/>
-          </p:cNvSpPr>
-          <p:nvPr>
-            <p:ph idx="1"/>
-          </p:nvPr>
-        </p:nvSpPr>
-        <p:spPr/>
-        <p:txBody>
-          <a:bodyPr/>
-          <a:lstStyle/>
-          <a:p>
-            <a:endParaRPr lang="en-US" dirty="0"/>
-          </a:p>
-        </p:txBody>
-      </p:sp>
-      <p:sp>
-        <p:nvSpPr>
-          <p:cNvPr id="4" name="Content Placeholder 2">
-            <a:extLst>
-              <a:ext uri="{FF2B5EF4-FFF2-40B4-BE49-F238E27FC236}">
-                <a16:creationId xmlns:a16="http://schemas.microsoft.com/office/drawing/2014/main" id="{A14BC6AA-D85D-1D20-B90D-CA59390AF393}"/>
-              </a:ext>
-            </a:extLst>
-          </p:cNvPr>
-          <p:cNvSpPr txBox="1">
-            <a:spLocks/>
-          </p:cNvSpPr>
-          <p:nvPr/>
-        </p:nvSpPr>
-        <p:spPr>
-          <a:xfrm>
-            <a:off x="695696" y="2546927"/>
-            <a:ext cx="10515600" cy="2477799"/>
-          </a:xfrm>
-          <a:prstGeom prst="rect">
-            <a:avLst/>
-          </a:prstGeom>
-        </p:spPr>
-        <p:txBody>
-          <a:bodyPr vert="horz" lIns="91440" tIns="45720" rIns="91440" bIns="45720" rtlCol="0">
-            <a:normAutofit/>
-          </a:bodyPr>
-          <a:lstStyle>
-            <a:lvl1pPr marL="228600" indent="-228600" algn="l" defTabSz="914400" rtl="0" eaLnBrk="1" latinLnBrk="0" hangingPunct="1">
-              <a:lnSpc>
-                <a:spcPct val="90000"/>
-              </a:lnSpc>
-              <a:spcBef>
-                <a:spcPts val="1000"/>
-              </a:spcBef>
-              <a:buFont typeface="Arial" panose="020B0604020202020204" pitchFamily="34" charset="0"/>
-              <a:buChar char="•"/>
-              <a:defRPr sz="2800" kern="1200">
-                <a:solidFill>
-                  <a:schemeClr val="tx1"/>
-                </a:solidFill>
-                <a:latin typeface="+mn-lt"/>
-                <a:ea typeface="+mn-ea"/>
-                <a:cs typeface="+mn-cs"/>
-              </a:defRPr>
-            </a:lvl1pPr>
-            <a:lvl2pPr marL="685800" indent="-228600" algn="l" defTabSz="914400" rtl="0" eaLnBrk="1" latinLnBrk="0" hangingPunct="1">
-              <a:lnSpc>
-                <a:spcPct val="90000"/>
-              </a:lnSpc>
-              <a:spcBef>
-                <a:spcPts val="500"/>
-              </a:spcBef>
-              <a:buFont typeface="Arial" panose="020B0604020202020204" pitchFamily="34" charset="0"/>
-              <a:buChar char="•"/>
-              <a:defRPr sz="2400" kern="1200">
-                <a:solidFill>
-                  <a:schemeClr val="tx1"/>
-                </a:solidFill>
-                <a:latin typeface="+mn-lt"/>
-                <a:ea typeface="+mn-ea"/>
-                <a:cs typeface="+mn-cs"/>
-              </a:defRPr>
-            </a:lvl2pPr>
-            <a:lvl3pPr marL="1143000" indent="-228600" algn="l" defTabSz="914400" rtl="0" eaLnBrk="1" latinLnBrk="0" hangingPunct="1">
-              <a:lnSpc>
-                <a:spcPct val="90000"/>
-              </a:lnSpc>
-              <a:spcBef>
-                <a:spcPts val="500"/>
-              </a:spcBef>
-              <a:buFont typeface="Arial" panose="020B0604020202020204" pitchFamily="34" charset="0"/>
-              <a:buChar char="•"/>
-              <a:defRPr sz="2000" kern="1200">
-                <a:solidFill>
-                  <a:schemeClr val="tx1"/>
-                </a:solidFill>
-                <a:latin typeface="+mn-lt"/>
-                <a:ea typeface="+mn-ea"/>
-                <a:cs typeface="+mn-cs"/>
-              </a:defRPr>
-            </a:lvl3pPr>
-            <a:lvl4pPr marL="1600200" indent="-228600" algn="l" defTabSz="914400" rtl="0" eaLnBrk="1" latinLnBrk="0" hangingPunct="1">
-              <a:lnSpc>
-                <a:spcPct val="90000"/>
-              </a:lnSpc>
-              <a:spcBef>
-                <a:spcPts val="500"/>
-              </a:spcBef>
-              <a:buFont typeface="Arial" panose="020B0604020202020204" pitchFamily="34" charset="0"/>
-              <a:buChar char="•"/>
-              <a:defRPr sz="1800" kern="1200">
-                <a:solidFill>
-                  <a:schemeClr val="tx1"/>
-                </a:solidFill>
-                <a:latin typeface="+mn-lt"/>
-                <a:ea typeface="+mn-ea"/>
-                <a:cs typeface="+mn-cs"/>
-              </a:defRPr>
-            </a:lvl4pPr>
-            <a:lvl5pPr marL="2057400" indent="-228600" algn="l" defTabSz="914400" rtl="0" eaLnBrk="1" latinLnBrk="0" hangingPunct="1">
-              <a:lnSpc>
-                <a:spcPct val="90000"/>
-              </a:lnSpc>
-              <a:spcBef>
-                <a:spcPts val="500"/>
-              </a:spcBef>
-              <a:buFont typeface="Arial" panose="020B0604020202020204" pitchFamily="34" charset="0"/>
-              <a:buChar char="•"/>
-              <a:defRPr sz="1800" kern="1200">
-                <a:solidFill>
-                  <a:schemeClr val="tx1"/>
-                </a:solidFill>
-                <a:latin typeface="+mn-lt"/>
-                <a:ea typeface="+mn-ea"/>
-                <a:cs typeface="+mn-cs"/>
-              </a:defRPr>
-            </a:lvl5pPr>
-            <a:lvl6pPr marL="2514600" indent="-228600" algn="l" defTabSz="914400" rtl="0" eaLnBrk="1" latinLnBrk="0" hangingPunct="1">
-              <a:lnSpc>
-                <a:spcPct val="90000"/>
-              </a:lnSpc>
-              <a:spcBef>
-                <a:spcPts val="500"/>
-              </a:spcBef>
-              <a:buFont typeface="Arial" panose="020B0604020202020204" pitchFamily="34" charset="0"/>
-              <a:buChar char="•"/>
-              <a:defRPr sz="1800" kern="1200">
-                <a:solidFill>
-                  <a:schemeClr val="tx1"/>
-                </a:solidFill>
-                <a:latin typeface="+mn-lt"/>
-                <a:ea typeface="+mn-ea"/>
-                <a:cs typeface="+mn-cs"/>
-              </a:defRPr>
-            </a:lvl6pPr>
-            <a:lvl7pPr marL="2971800" indent="-228600" algn="l" defTabSz="914400" rtl="0" eaLnBrk="1" latinLnBrk="0" hangingPunct="1">
-              <a:lnSpc>
-                <a:spcPct val="90000"/>
-              </a:lnSpc>
-              <a:spcBef>
-                <a:spcPts val="500"/>
-              </a:spcBef>
-              <a:buFont typeface="Arial" panose="020B0604020202020204" pitchFamily="34" charset="0"/>
-              <a:buChar char="•"/>
-              <a:defRPr sz="1800" kern="1200">
-                <a:solidFill>
-                  <a:schemeClr val="tx1"/>
-                </a:solidFill>
-                <a:latin typeface="+mn-lt"/>
-                <a:ea typeface="+mn-ea"/>
-                <a:cs typeface="+mn-cs"/>
-              </a:defRPr>
-            </a:lvl7pPr>
-            <a:lvl8pPr marL="3429000" indent="-228600" algn="l" defTabSz="914400" rtl="0" eaLnBrk="1" latinLnBrk="0" hangingPunct="1">
-              <a:lnSpc>
-                <a:spcPct val="90000"/>
-              </a:lnSpc>
-              <a:spcBef>
-                <a:spcPts val="500"/>
-              </a:spcBef>
-              <a:buFont typeface="Arial" panose="020B0604020202020204" pitchFamily="34" charset="0"/>
-              <a:buChar char="•"/>
-              <a:defRPr sz="1800" kern="1200">
-                <a:solidFill>
-                  <a:schemeClr val="tx1"/>
-                </a:solidFill>
-                <a:latin typeface="+mn-lt"/>
-                <a:ea typeface="+mn-ea"/>
-                <a:cs typeface="+mn-cs"/>
-              </a:defRPr>
-            </a:lvl8pPr>
-            <a:lvl9pPr marL="3886200" indent="-228600" algn="l" defTabSz="914400" rtl="0" eaLnBrk="1" latinLnBrk="0" hangingPunct="1">
-              <a:lnSpc>
-                <a:spcPct val="90000"/>
-              </a:lnSpc>
-              <a:spcBef>
-                <a:spcPts val="500"/>
-              </a:spcBef>
-              <a:buFont typeface="Arial" panose="020B0604020202020204" pitchFamily="34" charset="0"/>
-              <a:buChar char="•"/>
-              <a:defRPr sz="1800" kern="1200">
-                <a:solidFill>
-                  <a:schemeClr val="tx1"/>
-                </a:solidFill>
-                <a:latin typeface="+mn-lt"/>
-                <a:ea typeface="+mn-ea"/>
-                <a:cs typeface="+mn-cs"/>
-              </a:defRPr>
-            </a:lvl9pPr>
-          </a:lstStyle>
-          <a:p>
-            <a:pPr marL="0" indent="0" algn="ctr">
-              <a:buFont typeface="Arial" panose="020B0604020202020204" pitchFamily="34" charset="0"/>
-              <a:buNone/>
-            </a:pPr>
-            <a:r>
-              <a:rPr lang="en-US" sz="16600"/>
-              <a:t>DEMO</a:t>
-            </a:r>
-            <a:endParaRPr lang="en-US" sz="16600" dirty="0"/>
-          </a:p>
-        </p:txBody>
-      </p:sp>
-    </p:spTree>
-    <p:extLst>
-      <p:ext uri="{BB962C8B-B14F-4D97-AF65-F5344CB8AC3E}">
-        <p14:creationId xmlns:p14="http://schemas.microsoft.com/office/powerpoint/2010/main" val="762367994"/>
-      </p:ext>
-    </p:extLst>
-  </p:cSld>
-  <p:clrMapOvr>
-    <a:masterClrMapping/>
-  </p:clrMapOvr>
-</p:sld>
-</file>
-
 <file path=ppt/slides/slide16.xml><?xml version="1.0" encoding="utf-8"?>
 <p:sld xmlns:a="http://schemas.openxmlformats.org/drawingml/2006/main" xmlns:r="http://schemas.openxmlformats.org/officeDocument/2006/relationships" xmlns:p="http://schemas.openxmlformats.org/presentationml/2006/main">
   <p:cSld>
@@ -5673,7 +5726,7 @@
           <p:cNvPr id="2" name="Title 1">
             <a:extLst>
               <a:ext uri="{FF2B5EF4-FFF2-40B4-BE49-F238E27FC236}">
-                <a16:creationId xmlns:a16="http://schemas.microsoft.com/office/drawing/2014/main" id="{B07DDA85-2AC8-FAD3-BF10-AC810480D3FF}"/>
+                <a16:creationId xmlns:a16="http://schemas.microsoft.com/office/drawing/2014/main" id="{03468FD1-67D0-0034-CA14-E5AE7AA20B63}"/>
               </a:ext>
             </a:extLst>
           </p:cNvPr>
@@ -5686,14 +5739,12 @@
         </p:nvSpPr>
         <p:spPr/>
         <p:txBody>
-          <a:bodyPr>
-            <a:normAutofit/>
-          </a:bodyPr>
+          <a:bodyPr/>
           <a:lstStyle/>
           <a:p>
             <a:r>
               <a:rPr lang="en-US" dirty="0"/>
-              <a:t>Python Library - Package</a:t>
+              <a:t>PyCharm Notes</a:t>
             </a:r>
           </a:p>
         </p:txBody>
@@ -5703,7 +5754,7 @@
           <p:cNvPr id="3" name="Content Placeholder 2">
             <a:extLst>
               <a:ext uri="{FF2B5EF4-FFF2-40B4-BE49-F238E27FC236}">
-                <a16:creationId xmlns:a16="http://schemas.microsoft.com/office/drawing/2014/main" id="{11C33742-1445-1B07-3348-3E2B4F7E712C}"/>
+                <a16:creationId xmlns:a16="http://schemas.microsoft.com/office/drawing/2014/main" id="{A98F9959-90EC-6208-4A34-C285530205F5}"/>
               </a:ext>
             </a:extLst>
           </p:cNvPr>
@@ -5716,269 +5767,12 @@
         </p:nvSpPr>
         <p:spPr/>
         <p:txBody>
-          <a:bodyPr>
-            <a:normAutofit fontScale="40000" lnSpcReduction="20000"/>
-          </a:bodyPr>
+          <a:bodyPr/>
           <a:lstStyle/>
           <a:p>
-            <a:pPr marL="0" indent="0">
-              <a:buNone/>
-            </a:pPr>
-            <a:r>
-              <a:rPr lang="en-US" dirty="0"/>
-              <a:t>A 3rd party library or package is external code written by other developers that can be imported and used in your own Python programs.</a:t>
-            </a:r>
-          </a:p>
-          <a:p>
-            <a:pPr marL="0" indent="0">
-              <a:buNone/>
-            </a:pPr>
-            <a:endParaRPr lang="en-US" sz="300" dirty="0"/>
-          </a:p>
-          <a:p>
-            <a:pPr marL="0" indent="0">
-              <a:buNone/>
-            </a:pPr>
-            <a:r>
-              <a:rPr lang="en-US" b="1" dirty="0"/>
-              <a:t>Advantages:</a:t>
-            </a:r>
-          </a:p>
-          <a:p>
-            <a:r>
-              <a:rPr lang="en-US" dirty="0"/>
-              <a:t>Saves Time: no reinvention the wheel.</a:t>
-            </a:r>
-          </a:p>
-          <a:p>
-            <a:r>
-              <a:rPr lang="en-US" dirty="0"/>
-              <a:t>Enhances Functionality: Access to a wide range of specialized tools and functions.</a:t>
-            </a:r>
-          </a:p>
-          <a:p>
-            <a:r>
-              <a:rPr lang="en-US" dirty="0"/>
-              <a:t>Community Support: Benefit from contributions and updates by the developer community.</a:t>
-            </a:r>
-          </a:p>
-          <a:p>
-            <a:r>
-              <a:rPr lang="en-US" dirty="0"/>
-              <a:t>Focus on Core Logic: Allows developers to focus on their application's core logic.</a:t>
-            </a:r>
-          </a:p>
-          <a:p>
-            <a:endParaRPr lang="en-US" sz="300" dirty="0"/>
-          </a:p>
-          <a:p>
-            <a:pPr marL="0" indent="0">
-              <a:buNone/>
-            </a:pPr>
-            <a:r>
-              <a:rPr lang="en-US" b="1" dirty="0"/>
-              <a:t>Types of 3rd Party Libraries:</a:t>
-            </a:r>
-          </a:p>
-          <a:p>
-            <a:r>
-              <a:rPr lang="en-US" dirty="0"/>
-              <a:t>Standard Libraries: Included with Python installation. (</a:t>
-            </a:r>
-            <a:r>
-              <a:rPr lang="en-US" dirty="0" err="1"/>
-              <a:t>os</a:t>
-            </a:r>
-            <a:r>
-              <a:rPr lang="en-US" dirty="0"/>
-              <a:t> – sys – math - …)</a:t>
-            </a:r>
-          </a:p>
-          <a:p>
-            <a:r>
-              <a:rPr lang="en-US" dirty="0"/>
-              <a:t>External Libraries: Developed by other organizations or individuals. (</a:t>
-            </a:r>
-            <a:r>
-              <a:rPr lang="en-US" dirty="0" err="1"/>
-              <a:t>Numpy</a:t>
-            </a:r>
-            <a:r>
-              <a:rPr lang="en-US" dirty="0"/>
-              <a:t> – Matplotlib – TensorFlow - …)</a:t>
-            </a:r>
-          </a:p>
-          <a:p>
-            <a:pPr marL="0" indent="0">
-              <a:buNone/>
-            </a:pPr>
-            <a:endParaRPr lang="en-US" sz="300" dirty="0"/>
-          </a:p>
-          <a:p>
-            <a:pPr marL="0" indent="0">
-              <a:buNone/>
-            </a:pPr>
-            <a:r>
-              <a:rPr lang="en-US" b="1" dirty="0"/>
-              <a:t>Installing 3rd Party Libraries:</a:t>
-            </a:r>
-          </a:p>
-          <a:p>
-            <a:pPr marL="0" indent="0">
-              <a:buNone/>
-            </a:pPr>
-            <a:r>
-              <a:rPr lang="en-US" dirty="0"/>
-              <a:t>From command line / Terminal:</a:t>
-            </a:r>
-          </a:p>
-          <a:p>
-            <a:r>
-              <a:rPr lang="en-US" dirty="0">
-                <a:solidFill>
-                  <a:schemeClr val="bg1">
-                    <a:lumMod val="75000"/>
-                  </a:schemeClr>
-                </a:solidFill>
-                <a:latin typeface="Consolas" panose="020B0609020204030204" pitchFamily="49" charset="0"/>
-                <a:cs typeface="Consolas" panose="020B0609020204030204" pitchFamily="49" charset="0"/>
-              </a:rPr>
-              <a:t>pip install </a:t>
-            </a:r>
-            <a:r>
-              <a:rPr lang="en-US" dirty="0" err="1">
-                <a:solidFill>
-                  <a:schemeClr val="bg1">
-                    <a:lumMod val="75000"/>
-                  </a:schemeClr>
-                </a:solidFill>
-                <a:latin typeface="Consolas" panose="020B0609020204030204" pitchFamily="49" charset="0"/>
-                <a:cs typeface="Consolas" panose="020B0609020204030204" pitchFamily="49" charset="0"/>
-              </a:rPr>
-              <a:t>numpy</a:t>
-            </a:r>
-            <a:endParaRPr lang="en-US" dirty="0">
-              <a:solidFill>
-                <a:schemeClr val="bg1">
-                  <a:lumMod val="75000"/>
-                </a:schemeClr>
-              </a:solidFill>
-              <a:latin typeface="Consolas" panose="020B0609020204030204" pitchFamily="49" charset="0"/>
-              <a:cs typeface="Consolas" panose="020B0609020204030204" pitchFamily="49" charset="0"/>
-            </a:endParaRPr>
-          </a:p>
-          <a:p>
-            <a:r>
-              <a:rPr lang="en-US" dirty="0" err="1">
-                <a:solidFill>
-                  <a:schemeClr val="bg1">
-                    <a:lumMod val="75000"/>
-                  </a:schemeClr>
-                </a:solidFill>
-                <a:latin typeface="Consolas" panose="020B0609020204030204" pitchFamily="49" charset="0"/>
-                <a:cs typeface="Consolas" panose="020B0609020204030204" pitchFamily="49" charset="0"/>
-              </a:rPr>
-              <a:t>conda</a:t>
-            </a:r>
-            <a:r>
-              <a:rPr lang="en-US" dirty="0">
-                <a:solidFill>
-                  <a:schemeClr val="bg1">
-                    <a:lumMod val="75000"/>
-                  </a:schemeClr>
-                </a:solidFill>
-                <a:latin typeface="Consolas" panose="020B0609020204030204" pitchFamily="49" charset="0"/>
-                <a:cs typeface="Consolas" panose="020B0609020204030204" pitchFamily="49" charset="0"/>
-              </a:rPr>
-              <a:t> install </a:t>
-            </a:r>
-            <a:r>
-              <a:rPr lang="en-US" dirty="0" err="1">
-                <a:solidFill>
-                  <a:schemeClr val="bg1">
-                    <a:lumMod val="75000"/>
-                  </a:schemeClr>
-                </a:solidFill>
-                <a:latin typeface="Consolas" panose="020B0609020204030204" pitchFamily="49" charset="0"/>
-                <a:cs typeface="Consolas" panose="020B0609020204030204" pitchFamily="49" charset="0"/>
-              </a:rPr>
-              <a:t>numpy</a:t>
-            </a:r>
-            <a:endParaRPr lang="en-US" dirty="0">
-              <a:solidFill>
-                <a:schemeClr val="bg1">
-                  <a:lumMod val="75000"/>
-                </a:schemeClr>
-              </a:solidFill>
-              <a:latin typeface="Consolas" panose="020B0609020204030204" pitchFamily="49" charset="0"/>
-              <a:cs typeface="Consolas" panose="020B0609020204030204" pitchFamily="49" charset="0"/>
-            </a:endParaRPr>
-          </a:p>
-          <a:p>
-            <a:endParaRPr lang="en-US" sz="300" dirty="0">
-              <a:solidFill>
-                <a:schemeClr val="bg1">
-                  <a:lumMod val="75000"/>
-                </a:schemeClr>
-              </a:solidFill>
-              <a:latin typeface="Consolas" panose="020B0609020204030204" pitchFamily="49" charset="0"/>
-              <a:cs typeface="Consolas" panose="020B0609020204030204" pitchFamily="49" charset="0"/>
-            </a:endParaRPr>
-          </a:p>
-          <a:p>
-            <a:pPr marL="0" indent="0">
-              <a:buNone/>
-            </a:pPr>
-            <a:r>
-              <a:rPr lang="en-US" b="1" dirty="0"/>
-              <a:t>Importing a library in Python:</a:t>
-            </a:r>
-            <a:endParaRPr lang="en-US" dirty="0">
-              <a:solidFill>
-                <a:schemeClr val="bg1">
-                  <a:lumMod val="75000"/>
-                </a:schemeClr>
-              </a:solidFill>
-              <a:latin typeface="Consolas" panose="020B0609020204030204" pitchFamily="49" charset="0"/>
-              <a:cs typeface="Consolas" panose="020B0609020204030204" pitchFamily="49" charset="0"/>
-            </a:endParaRPr>
-          </a:p>
-          <a:p>
-            <a:r>
-              <a:rPr lang="en-US" dirty="0">
-                <a:solidFill>
-                  <a:schemeClr val="bg1">
-                    <a:lumMod val="75000"/>
-                  </a:schemeClr>
-                </a:solidFill>
-                <a:latin typeface="Consolas" panose="020B0609020204030204" pitchFamily="49" charset="0"/>
-                <a:cs typeface="Consolas" panose="020B0609020204030204" pitchFamily="49" charset="0"/>
-              </a:rPr>
-              <a:t>import </a:t>
-            </a:r>
-            <a:r>
-              <a:rPr lang="en-US" dirty="0" err="1">
-                <a:solidFill>
-                  <a:schemeClr val="bg1">
-                    <a:lumMod val="75000"/>
-                  </a:schemeClr>
-                </a:solidFill>
-                <a:latin typeface="Consolas" panose="020B0609020204030204" pitchFamily="49" charset="0"/>
-                <a:cs typeface="Consolas" panose="020B0609020204030204" pitchFamily="49" charset="0"/>
-              </a:rPr>
-              <a:t>numpy</a:t>
-            </a:r>
-            <a:r>
-              <a:rPr lang="en-US" dirty="0">
-                <a:solidFill>
-                  <a:schemeClr val="bg1">
-                    <a:lumMod val="75000"/>
-                  </a:schemeClr>
-                </a:solidFill>
-                <a:latin typeface="Consolas" panose="020B0609020204030204" pitchFamily="49" charset="0"/>
-                <a:cs typeface="Consolas" panose="020B0609020204030204" pitchFamily="49" charset="0"/>
-              </a:rPr>
-              <a:t> as np</a:t>
+            <a:r>
+              <a:rPr lang="en-US" dirty="0"/>
+              <a:t>Always right click and debug the file you want to debug</a:t>
             </a:r>
           </a:p>
         </p:txBody>
@@ -5986,7 +5780,7 @@
     </p:spTree>
     <p:extLst>
       <p:ext uri="{BB962C8B-B14F-4D97-AF65-F5344CB8AC3E}">
-        <p14:creationId xmlns:p14="http://schemas.microsoft.com/office/powerpoint/2010/main" val="1310907907"/>
+        <p14:creationId xmlns:p14="http://schemas.microsoft.com/office/powerpoint/2010/main" val="1638673681"/>
       </p:ext>
     </p:extLst>
   </p:cSld>
@@ -6031,12 +5825,25 @@
         </p:nvSpPr>
         <p:spPr/>
         <p:txBody>
-          <a:bodyPr/>
+          <a:bodyPr>
+            <a:normAutofit/>
+          </a:bodyPr>
           <a:lstStyle/>
           <a:p>
             <a:r>
               <a:rPr lang="en-US" dirty="0"/>
-              <a:t>Python Library - Package</a:t>
+              <a:t>Installing Python:</a:t>
+            </a:r>
+            <a:br>
+              <a:rPr lang="en-US" dirty="0"/>
+            </a:br>
+            <a:r>
+              <a:rPr lang="en-US" dirty="0" err="1"/>
+              <a:t>Installying</a:t>
+            </a:r>
+            <a:r>
+              <a:rPr lang="en-US" dirty="0"/>
+              <a:t> PyCharm</a:t>
             </a:r>
           </a:p>
         </p:txBody>
@@ -6273,7 +6080,7 @@
     </p:spTree>
     <p:extLst>
       <p:ext uri="{BB962C8B-B14F-4D97-AF65-F5344CB8AC3E}">
-        <p14:creationId xmlns:p14="http://schemas.microsoft.com/office/powerpoint/2010/main" val="468386226"/>
+        <p14:creationId xmlns:p14="http://schemas.microsoft.com/office/powerpoint/2010/main" val="413941352"/>
       </p:ext>
     </p:extLst>
   </p:cSld>
@@ -6305,7 +6112,7 @@
           <p:cNvPr id="2" name="Title 1">
             <a:extLst>
               <a:ext uri="{FF2B5EF4-FFF2-40B4-BE49-F238E27FC236}">
-                <a16:creationId xmlns:a16="http://schemas.microsoft.com/office/drawing/2014/main" id="{F8FDD5AF-6343-4753-8DE9-DF655C75EA9A}"/>
+                <a16:creationId xmlns:a16="http://schemas.microsoft.com/office/drawing/2014/main" id="{C54DE36A-8036-1E6E-6118-8AAB329666E5}"/>
               </a:ext>
             </a:extLst>
           </p:cNvPr>
@@ -6323,15 +6130,7 @@
           <a:p>
             <a:r>
               <a:rPr lang="en-US" dirty="0"/>
-              <a:t>3. a. 3</a:t>
-            </a:r>
-            <a:r>
-              <a:rPr lang="en-US" baseline="30000" dirty="0"/>
-              <a:t>rd</a:t>
-            </a:r>
-            <a:r>
-              <a:rPr lang="en-US" dirty="0"/>
-              <a:t> party libraries</a:t>
+              <a:t>Python Basics</a:t>
             </a:r>
           </a:p>
         </p:txBody>
@@ -6341,7 +6140,7 @@
           <p:cNvPr id="3" name="Content Placeholder 2">
             <a:extLst>
               <a:ext uri="{FF2B5EF4-FFF2-40B4-BE49-F238E27FC236}">
-                <a16:creationId xmlns:a16="http://schemas.microsoft.com/office/drawing/2014/main" id="{006F1C52-11BF-477A-934F-3A3FAAE86D6D}"/>
+                <a16:creationId xmlns:a16="http://schemas.microsoft.com/office/drawing/2014/main" id="{B896F93E-986A-ADD9-B1C2-3E17CA8670C7}"/>
               </a:ext>
             </a:extLst>
           </p:cNvPr>
@@ -6357,255 +6156,218 @@
           <a:bodyPr/>
           <a:lstStyle/>
           <a:p>
-            <a:r>
-              <a:rPr lang="en-US" dirty="0"/>
-              <a:t>For image processing:</a:t>
-            </a:r>
-          </a:p>
-        </p:txBody>
-      </p:sp>
-      <p:graphicFrame>
-        <p:nvGraphicFramePr>
-          <p:cNvPr id="4" name="Table 4">
-            <a:extLst>
-              <a:ext uri="{FF2B5EF4-FFF2-40B4-BE49-F238E27FC236}">
-                <a16:creationId xmlns:a16="http://schemas.microsoft.com/office/drawing/2014/main" id="{B33887B5-23FF-47C7-ACF1-724E0374C1D9}"/>
-              </a:ext>
-            </a:extLst>
-          </p:cNvPr>
-          <p:cNvGraphicFramePr>
-            <a:graphicFrameLocks noGrp="1"/>
-          </p:cNvGraphicFramePr>
-          <p:nvPr>
-            <p:extLst>
-              <p:ext uri="{D42A27DB-BD31-4B8C-83A1-F6EECF244321}">
-                <p14:modId xmlns:p14="http://schemas.microsoft.com/office/powerpoint/2010/main" val="2554044193"/>
-              </p:ext>
-            </p:extLst>
-          </p:nvPr>
-        </p:nvGraphicFramePr>
-        <p:xfrm>
-          <a:off x="2196387" y="2872740"/>
-          <a:ext cx="8127999" cy="1483360"/>
-        </p:xfrm>
-        <a:graphic>
-          <a:graphicData uri="http://schemas.openxmlformats.org/drawingml/2006/table">
-            <a:tbl>
-              <a:tblPr firstRow="1" bandRow="1">
-                <a:tableStyleId>{5C22544A-7EE6-4342-B048-85BDC9FD1C3A}</a:tableStyleId>
-              </a:tblPr>
-              <a:tblGrid>
-                <a:gridCol w="2709333">
-                  <a:extLst>
-                    <a:ext uri="{9D8B030D-6E8A-4147-A177-3AD203B41FA5}">
-                      <a16:colId xmlns:a16="http://schemas.microsoft.com/office/drawing/2014/main" val="499050389"/>
-                    </a:ext>
-                  </a:extLst>
-                </a:gridCol>
-                <a:gridCol w="2709333">
-                  <a:extLst>
-                    <a:ext uri="{9D8B030D-6E8A-4147-A177-3AD203B41FA5}">
-                      <a16:colId xmlns:a16="http://schemas.microsoft.com/office/drawing/2014/main" val="1264277190"/>
-                    </a:ext>
-                  </a:extLst>
-                </a:gridCol>
-                <a:gridCol w="2709333">
-                  <a:extLst>
-                    <a:ext uri="{9D8B030D-6E8A-4147-A177-3AD203B41FA5}">
-                      <a16:colId xmlns:a16="http://schemas.microsoft.com/office/drawing/2014/main" val="300104439"/>
-                    </a:ext>
-                  </a:extLst>
-                </a:gridCol>
-              </a:tblGrid>
-              <a:tr h="370840">
-                <a:tc>
-                  <a:txBody>
-                    <a:bodyPr/>
-                    <a:lstStyle/>
-                    <a:p>
-                      <a:endParaRPr lang="en-US"/>
-                    </a:p>
-                  </a:txBody>
-                  <a:tcPr/>
-                </a:tc>
-                <a:tc>
-                  <a:txBody>
-                    <a:bodyPr/>
-                    <a:lstStyle/>
-                    <a:p>
-                      <a:r>
-                        <a:rPr lang="en-US" dirty="0"/>
-                        <a:t>Scikit-Image</a:t>
-                      </a:r>
-                    </a:p>
-                  </a:txBody>
-                  <a:tcPr/>
-                </a:tc>
-                <a:tc>
-                  <a:txBody>
-                    <a:bodyPr/>
-                    <a:lstStyle/>
-                    <a:p>
-                      <a:r>
-                        <a:rPr lang="en-US" dirty="0"/>
-                        <a:t>OpenCV</a:t>
-                      </a:r>
-                    </a:p>
-                  </a:txBody>
-                  <a:tcPr/>
-                </a:tc>
-                <a:extLst>
-                  <a:ext uri="{0D108BD9-81ED-4DB2-BD59-A6C34878D82A}">
-                    <a16:rowId xmlns:a16="http://schemas.microsoft.com/office/drawing/2014/main" val="4130853037"/>
-                  </a:ext>
-                </a:extLst>
-              </a:tr>
-              <a:tr h="370840">
-                <a:tc>
-                  <a:txBody>
-                    <a:bodyPr/>
-                    <a:lstStyle/>
-                    <a:p>
-                      <a:r>
-                        <a:rPr lang="en-US" dirty="0"/>
-                        <a:t>Speed</a:t>
-                      </a:r>
-                    </a:p>
-                  </a:txBody>
-                  <a:tcPr/>
-                </a:tc>
-                <a:tc>
-                  <a:txBody>
-                    <a:bodyPr/>
-                    <a:lstStyle/>
-                    <a:p>
-                      <a:r>
-                        <a:rPr lang="en-US" dirty="0"/>
-                        <a:t>Slow</a:t>
-                      </a:r>
-                    </a:p>
-                  </a:txBody>
-                  <a:tcPr/>
-                </a:tc>
-                <a:tc>
-                  <a:txBody>
-                    <a:bodyPr/>
-                    <a:lstStyle/>
-                    <a:p>
-                      <a:r>
-                        <a:rPr lang="en-US" dirty="0"/>
-                        <a:t>Fast</a:t>
-                      </a:r>
-                    </a:p>
-                  </a:txBody>
-                  <a:tcPr/>
-                </a:tc>
-                <a:extLst>
-                  <a:ext uri="{0D108BD9-81ED-4DB2-BD59-A6C34878D82A}">
-                    <a16:rowId xmlns:a16="http://schemas.microsoft.com/office/drawing/2014/main" val="2712355243"/>
-                  </a:ext>
-                </a:extLst>
-              </a:tr>
-              <a:tr h="370840">
-                <a:tc>
-                  <a:txBody>
-                    <a:bodyPr/>
-                    <a:lstStyle/>
-                    <a:p>
-                      <a:r>
-                        <a:rPr lang="en-US" dirty="0"/>
-                        <a:t>Documentation</a:t>
-                      </a:r>
-                    </a:p>
-                  </a:txBody>
-                  <a:tcPr/>
-                </a:tc>
-                <a:tc>
-                  <a:txBody>
-                    <a:bodyPr/>
-                    <a:lstStyle/>
-                    <a:p>
-                      <a:r>
-                        <a:rPr lang="en-US" dirty="0"/>
-                        <a:t>Good</a:t>
-                      </a:r>
-                    </a:p>
-                  </a:txBody>
-                  <a:tcPr/>
-                </a:tc>
-                <a:tc>
-                  <a:txBody>
-                    <a:bodyPr/>
-                    <a:lstStyle/>
-                    <a:p>
-                      <a:r>
-                        <a:rPr lang="en-US" dirty="0"/>
-                        <a:t>Bad</a:t>
-                      </a:r>
-                    </a:p>
-                  </a:txBody>
-                  <a:tcPr/>
-                </a:tc>
-                <a:extLst>
-                  <a:ext uri="{0D108BD9-81ED-4DB2-BD59-A6C34878D82A}">
-                    <a16:rowId xmlns:a16="http://schemas.microsoft.com/office/drawing/2014/main" val="36617547"/>
-                  </a:ext>
-                </a:extLst>
-              </a:tr>
-              <a:tr h="370840">
-                <a:tc>
-                  <a:txBody>
-                    <a:bodyPr/>
-                    <a:lstStyle/>
-                    <a:p>
-                      <a:r>
-                        <a:rPr lang="en-US" dirty="0"/>
-                        <a:t>Datatype</a:t>
-                      </a:r>
-                    </a:p>
-                  </a:txBody>
-                  <a:tcPr/>
-                </a:tc>
-                <a:tc>
-                  <a:txBody>
-                    <a:bodyPr/>
-                    <a:lstStyle/>
-                    <a:p>
-                      <a:r>
-                        <a:rPr lang="en-US" dirty="0"/>
-                        <a:t>float</a:t>
-                      </a:r>
-                    </a:p>
-                  </a:txBody>
-                  <a:tcPr/>
-                </a:tc>
-                <a:tc>
-                  <a:txBody>
-                    <a:bodyPr/>
-                    <a:lstStyle/>
-                    <a:p>
-                      <a:r>
-                        <a:rPr lang="en-US" dirty="0"/>
-                        <a:t>uint8</a:t>
-                      </a:r>
-                    </a:p>
-                  </a:txBody>
-                  <a:tcPr/>
-                </a:tc>
-                <a:extLst>
-                  <a:ext uri="{0D108BD9-81ED-4DB2-BD59-A6C34878D82A}">
-                    <a16:rowId xmlns:a16="http://schemas.microsoft.com/office/drawing/2014/main" val="1702374622"/>
-                  </a:ext>
-                </a:extLst>
-              </a:tr>
-            </a:tbl>
-          </a:graphicData>
-        </a:graphic>
-      </p:graphicFrame>
+            <a:endParaRPr lang="en-US" dirty="0"/>
+          </a:p>
+        </p:txBody>
+      </p:sp>
+      <p:sp>
+        <p:nvSpPr>
+          <p:cNvPr id="4" name="Content Placeholder 2">
+            <a:extLst>
+              <a:ext uri="{FF2B5EF4-FFF2-40B4-BE49-F238E27FC236}">
+                <a16:creationId xmlns:a16="http://schemas.microsoft.com/office/drawing/2014/main" id="{A14BC6AA-D85D-1D20-B90D-CA59390AF393}"/>
+              </a:ext>
+            </a:extLst>
+          </p:cNvPr>
+          <p:cNvSpPr txBox="1">
+            <a:spLocks/>
+          </p:cNvSpPr>
+          <p:nvPr/>
+        </p:nvSpPr>
+        <p:spPr>
+          <a:xfrm>
+            <a:off x="695696" y="2546927"/>
+            <a:ext cx="10515600" cy="2477799"/>
+          </a:xfrm>
+          <a:prstGeom prst="rect">
+            <a:avLst/>
+          </a:prstGeom>
+        </p:spPr>
+        <p:txBody>
+          <a:bodyPr vert="horz" lIns="91440" tIns="45720" rIns="91440" bIns="45720" rtlCol="0">
+            <a:normAutofit/>
+          </a:bodyPr>
+          <a:lstStyle>
+            <a:lvl1pPr marL="228600" indent="-228600" algn="l" defTabSz="914400" rtl="0" eaLnBrk="1" latinLnBrk="0" hangingPunct="1">
+              <a:lnSpc>
+                <a:spcPct val="90000"/>
+              </a:lnSpc>
+              <a:spcBef>
+                <a:spcPts val="1000"/>
+              </a:spcBef>
+              <a:buFont typeface="Arial" panose="020B0604020202020204" pitchFamily="34" charset="0"/>
+              <a:buChar char="•"/>
+              <a:defRPr sz="2800" kern="1200">
+                <a:solidFill>
+                  <a:schemeClr val="tx1"/>
+                </a:solidFill>
+                <a:latin typeface="+mn-lt"/>
+                <a:ea typeface="+mn-ea"/>
+                <a:cs typeface="+mn-cs"/>
+              </a:defRPr>
+            </a:lvl1pPr>
+            <a:lvl2pPr marL="685800" indent="-228600" algn="l" defTabSz="914400" rtl="0" eaLnBrk="1" latinLnBrk="0" hangingPunct="1">
+              <a:lnSpc>
+                <a:spcPct val="90000"/>
+              </a:lnSpc>
+              <a:spcBef>
+                <a:spcPts val="500"/>
+              </a:spcBef>
+              <a:buFont typeface="Arial" panose="020B0604020202020204" pitchFamily="34" charset="0"/>
+              <a:buChar char="•"/>
+              <a:defRPr sz="2400" kern="1200">
+                <a:solidFill>
+                  <a:schemeClr val="tx1"/>
+                </a:solidFill>
+                <a:latin typeface="+mn-lt"/>
+                <a:ea typeface="+mn-ea"/>
+                <a:cs typeface="+mn-cs"/>
+              </a:defRPr>
+            </a:lvl2pPr>
+            <a:lvl3pPr marL="1143000" indent="-228600" algn="l" defTabSz="914400" rtl="0" eaLnBrk="1" latinLnBrk="0" hangingPunct="1">
+              <a:lnSpc>
+                <a:spcPct val="90000"/>
+              </a:lnSpc>
+              <a:spcBef>
+                <a:spcPts val="500"/>
+              </a:spcBef>
+              <a:buFont typeface="Arial" panose="020B0604020202020204" pitchFamily="34" charset="0"/>
+              <a:buChar char="•"/>
+              <a:defRPr sz="2000" kern="1200">
+                <a:solidFill>
+                  <a:schemeClr val="tx1"/>
+                </a:solidFill>
+                <a:latin typeface="+mn-lt"/>
+                <a:ea typeface="+mn-ea"/>
+                <a:cs typeface="+mn-cs"/>
+              </a:defRPr>
+            </a:lvl3pPr>
+            <a:lvl4pPr marL="1600200" indent="-228600" algn="l" defTabSz="914400" rtl="0" eaLnBrk="1" latinLnBrk="0" hangingPunct="1">
+              <a:lnSpc>
+                <a:spcPct val="90000"/>
+              </a:lnSpc>
+              <a:spcBef>
+                <a:spcPts val="500"/>
+              </a:spcBef>
+              <a:buFont typeface="Arial" panose="020B0604020202020204" pitchFamily="34" charset="0"/>
+              <a:buChar char="•"/>
+              <a:defRPr sz="1800" kern="1200">
+                <a:solidFill>
+                  <a:schemeClr val="tx1"/>
+                </a:solidFill>
+                <a:latin typeface="+mn-lt"/>
+                <a:ea typeface="+mn-ea"/>
+                <a:cs typeface="+mn-cs"/>
+              </a:defRPr>
+            </a:lvl4pPr>
+            <a:lvl5pPr marL="2057400" indent="-228600" algn="l" defTabSz="914400" rtl="0" eaLnBrk="1" latinLnBrk="0" hangingPunct="1">
+              <a:lnSpc>
+                <a:spcPct val="90000"/>
+              </a:lnSpc>
+              <a:spcBef>
+                <a:spcPts val="500"/>
+              </a:spcBef>
+              <a:buFont typeface="Arial" panose="020B0604020202020204" pitchFamily="34" charset="0"/>
+              <a:buChar char="•"/>
+              <a:defRPr sz="1800" kern="1200">
+                <a:solidFill>
+                  <a:schemeClr val="tx1"/>
+                </a:solidFill>
+                <a:latin typeface="+mn-lt"/>
+                <a:ea typeface="+mn-ea"/>
+                <a:cs typeface="+mn-cs"/>
+              </a:defRPr>
+            </a:lvl5pPr>
+            <a:lvl6pPr marL="2514600" indent="-228600" algn="l" defTabSz="914400" rtl="0" eaLnBrk="1" latinLnBrk="0" hangingPunct="1">
+              <a:lnSpc>
+                <a:spcPct val="90000"/>
+              </a:lnSpc>
+              <a:spcBef>
+                <a:spcPts val="500"/>
+              </a:spcBef>
+              <a:buFont typeface="Arial" panose="020B0604020202020204" pitchFamily="34" charset="0"/>
+              <a:buChar char="•"/>
+              <a:defRPr sz="1800" kern="1200">
+                <a:solidFill>
+                  <a:schemeClr val="tx1"/>
+                </a:solidFill>
+                <a:latin typeface="+mn-lt"/>
+                <a:ea typeface="+mn-ea"/>
+                <a:cs typeface="+mn-cs"/>
+              </a:defRPr>
+            </a:lvl6pPr>
+            <a:lvl7pPr marL="2971800" indent="-228600" algn="l" defTabSz="914400" rtl="0" eaLnBrk="1" latinLnBrk="0" hangingPunct="1">
+              <a:lnSpc>
+                <a:spcPct val="90000"/>
+              </a:lnSpc>
+              <a:spcBef>
+                <a:spcPts val="500"/>
+              </a:spcBef>
+              <a:buFont typeface="Arial" panose="020B0604020202020204" pitchFamily="34" charset="0"/>
+              <a:buChar char="•"/>
+              <a:defRPr sz="1800" kern="1200">
+                <a:solidFill>
+                  <a:schemeClr val="tx1"/>
+                </a:solidFill>
+                <a:latin typeface="+mn-lt"/>
+                <a:ea typeface="+mn-ea"/>
+                <a:cs typeface="+mn-cs"/>
+              </a:defRPr>
+            </a:lvl7pPr>
+            <a:lvl8pPr marL="3429000" indent="-228600" algn="l" defTabSz="914400" rtl="0" eaLnBrk="1" latinLnBrk="0" hangingPunct="1">
+              <a:lnSpc>
+                <a:spcPct val="90000"/>
+              </a:lnSpc>
+              <a:spcBef>
+                <a:spcPts val="500"/>
+              </a:spcBef>
+              <a:buFont typeface="Arial" panose="020B0604020202020204" pitchFamily="34" charset="0"/>
+              <a:buChar char="•"/>
+              <a:defRPr sz="1800" kern="1200">
+                <a:solidFill>
+                  <a:schemeClr val="tx1"/>
+                </a:solidFill>
+                <a:latin typeface="+mn-lt"/>
+                <a:ea typeface="+mn-ea"/>
+                <a:cs typeface="+mn-cs"/>
+              </a:defRPr>
+            </a:lvl8pPr>
+            <a:lvl9pPr marL="3886200" indent="-228600" algn="l" defTabSz="914400" rtl="0" eaLnBrk="1" latinLnBrk="0" hangingPunct="1">
+              <a:lnSpc>
+                <a:spcPct val="90000"/>
+              </a:lnSpc>
+              <a:spcBef>
+                <a:spcPts val="500"/>
+              </a:spcBef>
+              <a:buFont typeface="Arial" panose="020B0604020202020204" pitchFamily="34" charset="0"/>
+              <a:buChar char="•"/>
+              <a:defRPr sz="1800" kern="1200">
+                <a:solidFill>
+                  <a:schemeClr val="tx1"/>
+                </a:solidFill>
+                <a:latin typeface="+mn-lt"/>
+                <a:ea typeface="+mn-ea"/>
+                <a:cs typeface="+mn-cs"/>
+              </a:defRPr>
+            </a:lvl9pPr>
+          </a:lstStyle>
+          <a:p>
+            <a:pPr marL="0" indent="0" algn="ctr">
+              <a:buFont typeface="Arial" panose="020B0604020202020204" pitchFamily="34" charset="0"/>
+              <a:buNone/>
+            </a:pPr>
+            <a:r>
+              <a:rPr lang="en-US" sz="16600"/>
+              <a:t>DEMO</a:t>
+            </a:r>
+            <a:endParaRPr lang="en-US" sz="16600" dirty="0"/>
+          </a:p>
+        </p:txBody>
+      </p:sp>
     </p:spTree>
     <p:extLst>
       <p:ext uri="{BB962C8B-B14F-4D97-AF65-F5344CB8AC3E}">
-        <p14:creationId xmlns:p14="http://schemas.microsoft.com/office/powerpoint/2010/main" val="4070966565"/>
+        <p14:creationId xmlns:p14="http://schemas.microsoft.com/office/powerpoint/2010/main" val="762367994"/>
       </p:ext>
     </p:extLst>
   </p:cSld>
@@ -6637,7 +6399,7 @@
           <p:cNvPr id="2" name="Title 1">
             <a:extLst>
               <a:ext uri="{FF2B5EF4-FFF2-40B4-BE49-F238E27FC236}">
-                <a16:creationId xmlns:a16="http://schemas.microsoft.com/office/drawing/2014/main" id="{555D9E4B-4960-A6AD-FF75-2EA3F9C107ED}"/>
+                <a16:creationId xmlns:a16="http://schemas.microsoft.com/office/drawing/2014/main" id="{B07DDA85-2AC8-FAD3-BF10-AC810480D3FF}"/>
               </a:ext>
             </a:extLst>
           </p:cNvPr>
@@ -6650,171 +6412,284 @@
         </p:nvSpPr>
         <p:spPr/>
         <p:txBody>
-          <a:bodyPr/>
+          <a:bodyPr>
+            <a:normAutofit/>
+          </a:bodyPr>
           <a:lstStyle/>
           <a:p>
             <a:r>
               <a:rPr lang="en-US" dirty="0"/>
-              <a:t>3. b. iii. datatypes</a:t>
-            </a:r>
-          </a:p>
-        </p:txBody>
-      </p:sp>
-      <p:graphicFrame>
-        <p:nvGraphicFramePr>
-          <p:cNvPr id="5" name="Table 5">
-            <a:extLst>
-              <a:ext uri="{FF2B5EF4-FFF2-40B4-BE49-F238E27FC236}">
-                <a16:creationId xmlns:a16="http://schemas.microsoft.com/office/drawing/2014/main" id="{FC2CCB00-CB38-F3D2-166F-E9638389FC83}"/>
-              </a:ext>
-            </a:extLst>
-          </p:cNvPr>
-          <p:cNvGraphicFramePr>
-            <a:graphicFrameLocks noGrp="1"/>
-          </p:cNvGraphicFramePr>
+              <a:t>Python Library - Package</a:t>
+            </a:r>
+          </a:p>
+        </p:txBody>
+      </p:sp>
+      <p:sp>
+        <p:nvSpPr>
+          <p:cNvPr id="3" name="Content Placeholder 2">
+            <a:extLst>
+              <a:ext uri="{FF2B5EF4-FFF2-40B4-BE49-F238E27FC236}">
+                <a16:creationId xmlns:a16="http://schemas.microsoft.com/office/drawing/2014/main" id="{11C33742-1445-1B07-3348-3E2B4F7E712C}"/>
+              </a:ext>
+            </a:extLst>
+          </p:cNvPr>
+          <p:cNvSpPr>
+            <a:spLocks noGrp="1"/>
+          </p:cNvSpPr>
           <p:nvPr>
             <p:ph idx="1"/>
-            <p:extLst>
-              <p:ext uri="{D42A27DB-BD31-4B8C-83A1-F6EECF244321}">
-                <p14:modId xmlns:p14="http://schemas.microsoft.com/office/powerpoint/2010/main" val="106828182"/>
-              </p:ext>
-            </p:extLst>
-          </p:nvPr>
-        </p:nvGraphicFramePr>
-        <p:xfrm>
-          <a:off x="838200" y="1825625"/>
-          <a:ext cx="10515600" cy="1112520"/>
-        </p:xfrm>
-        <a:graphic>
-          <a:graphicData uri="http://schemas.openxmlformats.org/drawingml/2006/table">
-            <a:tbl>
-              <a:tblPr firstRow="1" bandRow="1">
-                <a:tableStyleId>{5C22544A-7EE6-4342-B048-85BDC9FD1C3A}</a:tableStyleId>
-              </a:tblPr>
-              <a:tblGrid>
-                <a:gridCol w="5257800">
-                  <a:extLst>
-                    <a:ext uri="{9D8B030D-6E8A-4147-A177-3AD203B41FA5}">
-                      <a16:colId xmlns:a16="http://schemas.microsoft.com/office/drawing/2014/main" val="816991324"/>
-                    </a:ext>
-                  </a:extLst>
-                </a:gridCol>
-                <a:gridCol w="5257800">
-                  <a:extLst>
-                    <a:ext uri="{9D8B030D-6E8A-4147-A177-3AD203B41FA5}">
-                      <a16:colId xmlns:a16="http://schemas.microsoft.com/office/drawing/2014/main" val="3761373467"/>
-                    </a:ext>
-                  </a:extLst>
-                </a:gridCol>
-              </a:tblGrid>
-              <a:tr h="370840">
-                <a:tc>
-                  <a:txBody>
-                    <a:bodyPr/>
-                    <a:lstStyle/>
-                    <a:p>
-                      <a:r>
-                        <a:rPr lang="en-US" dirty="0"/>
-                        <a:t>Library</a:t>
-                      </a:r>
-                    </a:p>
-                  </a:txBody>
-                  <a:tcPr/>
-                </a:tc>
-                <a:tc>
-                  <a:txBody>
-                    <a:bodyPr/>
-                    <a:lstStyle/>
-                    <a:p>
-                      <a:r>
-                        <a:rPr lang="en-US" dirty="0"/>
-                        <a:t>Datatype</a:t>
-                      </a:r>
-                    </a:p>
-                  </a:txBody>
-                  <a:tcPr/>
-                </a:tc>
-                <a:extLst>
-                  <a:ext uri="{0D108BD9-81ED-4DB2-BD59-A6C34878D82A}">
-                    <a16:rowId xmlns:a16="http://schemas.microsoft.com/office/drawing/2014/main" val="3931259268"/>
-                  </a:ext>
-                </a:extLst>
-              </a:tr>
-              <a:tr h="370840">
-                <a:tc>
-                  <a:txBody>
-                    <a:bodyPr/>
-                    <a:lstStyle/>
-                    <a:p>
-                      <a:r>
-                        <a:rPr lang="en-US" dirty="0"/>
-                        <a:t>Scikit-image</a:t>
-                      </a:r>
-                    </a:p>
-                  </a:txBody>
-                  <a:tcPr/>
-                </a:tc>
-                <a:tc>
-                  <a:txBody>
-                    <a:bodyPr/>
-                    <a:lstStyle/>
-                    <a:p>
-                      <a:r>
-                        <a:rPr lang="en-US" dirty="0"/>
-                        <a:t>Float</a:t>
-                      </a:r>
-                    </a:p>
-                  </a:txBody>
-                  <a:tcPr/>
-                </a:tc>
-                <a:extLst>
-                  <a:ext uri="{0D108BD9-81ED-4DB2-BD59-A6C34878D82A}">
-                    <a16:rowId xmlns:a16="http://schemas.microsoft.com/office/drawing/2014/main" val="1841829291"/>
-                  </a:ext>
-                </a:extLst>
-              </a:tr>
-              <a:tr h="370840">
-                <a:tc>
-                  <a:txBody>
-                    <a:bodyPr/>
-                    <a:lstStyle/>
-                    <a:p>
-                      <a:r>
-                        <a:rPr lang="en-US" dirty="0"/>
-                        <a:t>OpenCV</a:t>
-                      </a:r>
-                    </a:p>
-                  </a:txBody>
-                  <a:tcPr/>
-                </a:tc>
-                <a:tc>
-                  <a:txBody>
-                    <a:bodyPr/>
-                    <a:lstStyle/>
-                    <a:p>
-                      <a:r>
-                        <a:rPr lang="en-US" dirty="0" err="1"/>
-                        <a:t>uint</a:t>
-                      </a:r>
-                      <a:endParaRPr lang="en-US" dirty="0"/>
-                    </a:p>
-                  </a:txBody>
-                  <a:tcPr/>
-                </a:tc>
-                <a:extLst>
-                  <a:ext uri="{0D108BD9-81ED-4DB2-BD59-A6C34878D82A}">
-                    <a16:rowId xmlns:a16="http://schemas.microsoft.com/office/drawing/2014/main" val="1134000350"/>
-                  </a:ext>
-                </a:extLst>
-              </a:tr>
-            </a:tbl>
-          </a:graphicData>
-        </a:graphic>
-      </p:graphicFrame>
+          </p:nvPr>
+        </p:nvSpPr>
+        <p:spPr/>
+        <p:txBody>
+          <a:bodyPr>
+            <a:normAutofit fontScale="92500" lnSpcReduction="10000"/>
+          </a:bodyPr>
+          <a:lstStyle/>
+          <a:p>
+            <a:pPr marL="0" indent="0">
+              <a:buNone/>
+            </a:pPr>
+            <a:r>
+              <a:rPr lang="en-US" sz="1400" dirty="0"/>
+              <a:t>A 3rd party library or package is external code written by other developers that can be imported and used in your own Python programs.</a:t>
+            </a:r>
+            <a:endParaRPr lang="en-US" sz="900" dirty="0"/>
+          </a:p>
+          <a:p>
+            <a:pPr marL="0" indent="0">
+              <a:buNone/>
+            </a:pPr>
+            <a:r>
+              <a:rPr lang="en-US" sz="1400" b="1" dirty="0"/>
+              <a:t>Advantages:</a:t>
+            </a:r>
+          </a:p>
+          <a:p>
+            <a:r>
+              <a:rPr lang="en-US" sz="1400" dirty="0"/>
+              <a:t>Saves Time: no reinvention the wheel.</a:t>
+            </a:r>
+          </a:p>
+          <a:p>
+            <a:r>
+              <a:rPr lang="en-US" sz="1400" dirty="0"/>
+              <a:t>Enhances Functionality: Access to a wide range of specialized tools and functions.</a:t>
+            </a:r>
+          </a:p>
+          <a:p>
+            <a:r>
+              <a:rPr lang="en-US" sz="1400" dirty="0"/>
+              <a:t>Community Support: Benefit from contributions and updates by the developer community.</a:t>
+            </a:r>
+          </a:p>
+          <a:p>
+            <a:r>
+              <a:rPr lang="en-US" sz="1400" dirty="0"/>
+              <a:t>Focus on Core Logic: Allows developers to focus on their application's core logic.</a:t>
+            </a:r>
+            <a:endParaRPr lang="en-US" sz="900" dirty="0"/>
+          </a:p>
+          <a:p>
+            <a:pPr marL="0" indent="0">
+              <a:buNone/>
+            </a:pPr>
+            <a:r>
+              <a:rPr lang="en-US" sz="1400" b="1" dirty="0"/>
+              <a:t>Types of 3rd Party Libraries:</a:t>
+            </a:r>
+          </a:p>
+          <a:p>
+            <a:r>
+              <a:rPr lang="en-US" sz="1400" dirty="0"/>
+              <a:t>Standard Libraries: Included with Python installation. (</a:t>
+            </a:r>
+            <a:r>
+              <a:rPr lang="en-US" sz="1400" dirty="0" err="1"/>
+              <a:t>os</a:t>
+            </a:r>
+            <a:r>
+              <a:rPr lang="en-US" sz="1400" dirty="0"/>
+              <a:t> – sys – math - …)</a:t>
+            </a:r>
+          </a:p>
+          <a:p>
+            <a:r>
+              <a:rPr lang="en-US" sz="1400" dirty="0"/>
+              <a:t>External Libraries: Developed by other organizations or individuals. (</a:t>
+            </a:r>
+            <a:r>
+              <a:rPr lang="en-US" sz="1400" dirty="0" err="1"/>
+              <a:t>Numpy</a:t>
+            </a:r>
+            <a:r>
+              <a:rPr lang="en-US" sz="1400" dirty="0"/>
+              <a:t> – Matplotlib – TensorFlow - …)</a:t>
+            </a:r>
+            <a:endParaRPr lang="en-US" sz="900" dirty="0"/>
+          </a:p>
+          <a:p>
+            <a:pPr marL="0" indent="0">
+              <a:buNone/>
+            </a:pPr>
+            <a:r>
+              <a:rPr lang="en-US" sz="1400" b="1" dirty="0"/>
+              <a:t>Installing 3rd Party Libraries:</a:t>
+            </a:r>
+          </a:p>
+          <a:p>
+            <a:pPr marL="0" indent="0">
+              <a:buNone/>
+            </a:pPr>
+            <a:r>
+              <a:rPr lang="en-US" sz="1400" dirty="0"/>
+              <a:t>From command line / Terminal:</a:t>
+            </a:r>
+          </a:p>
+          <a:p>
+            <a:r>
+              <a:rPr lang="en-US" sz="1400" dirty="0">
+                <a:solidFill>
+                  <a:schemeClr val="bg1">
+                    <a:lumMod val="75000"/>
+                  </a:schemeClr>
+                </a:solidFill>
+                <a:latin typeface="Consolas" panose="020B0609020204030204" pitchFamily="49" charset="0"/>
+                <a:cs typeface="Consolas" panose="020B0609020204030204" pitchFamily="49" charset="0"/>
+              </a:rPr>
+              <a:t>pip install </a:t>
+            </a:r>
+            <a:r>
+              <a:rPr lang="en-US" sz="1400" dirty="0" err="1">
+                <a:solidFill>
+                  <a:schemeClr val="bg1">
+                    <a:lumMod val="75000"/>
+                  </a:schemeClr>
+                </a:solidFill>
+                <a:latin typeface="Consolas" panose="020B0609020204030204" pitchFamily="49" charset="0"/>
+                <a:cs typeface="Consolas" panose="020B0609020204030204" pitchFamily="49" charset="0"/>
+              </a:rPr>
+              <a:t>numpy</a:t>
+            </a:r>
+            <a:endParaRPr lang="en-US" sz="1400" dirty="0">
+              <a:solidFill>
+                <a:schemeClr val="bg1">
+                  <a:lumMod val="75000"/>
+                </a:schemeClr>
+              </a:solidFill>
+              <a:latin typeface="Consolas" panose="020B0609020204030204" pitchFamily="49" charset="0"/>
+              <a:cs typeface="Consolas" panose="020B0609020204030204" pitchFamily="49" charset="0"/>
+            </a:endParaRPr>
+          </a:p>
+          <a:p>
+            <a:r>
+              <a:rPr lang="en-US" sz="1400" dirty="0" err="1">
+                <a:solidFill>
+                  <a:schemeClr val="bg1">
+                    <a:lumMod val="75000"/>
+                  </a:schemeClr>
+                </a:solidFill>
+                <a:latin typeface="Consolas" panose="020B0609020204030204" pitchFamily="49" charset="0"/>
+                <a:cs typeface="Consolas" panose="020B0609020204030204" pitchFamily="49" charset="0"/>
+              </a:rPr>
+              <a:t>conda</a:t>
+            </a:r>
+            <a:r>
+              <a:rPr lang="en-US" sz="1400" dirty="0">
+                <a:solidFill>
+                  <a:schemeClr val="bg1">
+                    <a:lumMod val="75000"/>
+                  </a:schemeClr>
+                </a:solidFill>
+                <a:latin typeface="Consolas" panose="020B0609020204030204" pitchFamily="49" charset="0"/>
+                <a:cs typeface="Consolas" panose="020B0609020204030204" pitchFamily="49" charset="0"/>
+              </a:rPr>
+              <a:t> install </a:t>
+            </a:r>
+            <a:r>
+              <a:rPr lang="en-US" sz="1400" dirty="0" err="1">
+                <a:solidFill>
+                  <a:schemeClr val="bg1">
+                    <a:lumMod val="75000"/>
+                  </a:schemeClr>
+                </a:solidFill>
+                <a:latin typeface="Consolas" panose="020B0609020204030204" pitchFamily="49" charset="0"/>
+                <a:cs typeface="Consolas" panose="020B0609020204030204" pitchFamily="49" charset="0"/>
+              </a:rPr>
+              <a:t>numpy</a:t>
+            </a:r>
+            <a:endParaRPr lang="en-US" sz="900" dirty="0">
+              <a:solidFill>
+                <a:schemeClr val="bg1">
+                  <a:lumMod val="75000"/>
+                </a:schemeClr>
+              </a:solidFill>
+              <a:latin typeface="Consolas" panose="020B0609020204030204" pitchFamily="49" charset="0"/>
+              <a:cs typeface="Consolas" panose="020B0609020204030204" pitchFamily="49" charset="0"/>
+            </a:endParaRPr>
+          </a:p>
+          <a:p>
+            <a:pPr marL="0" indent="0">
+              <a:buNone/>
+            </a:pPr>
+            <a:r>
+              <a:rPr lang="en-US" sz="1400" b="1" dirty="0"/>
+              <a:t>Importing a library in Python:</a:t>
+            </a:r>
+            <a:endParaRPr lang="en-US" sz="1400" dirty="0">
+              <a:solidFill>
+                <a:schemeClr val="bg1">
+                  <a:lumMod val="75000"/>
+                </a:schemeClr>
+              </a:solidFill>
+              <a:latin typeface="Consolas" panose="020B0609020204030204" pitchFamily="49" charset="0"/>
+              <a:cs typeface="Consolas" panose="020B0609020204030204" pitchFamily="49" charset="0"/>
+            </a:endParaRPr>
+          </a:p>
+          <a:p>
+            <a:r>
+              <a:rPr lang="en-US" sz="1400" dirty="0">
+                <a:solidFill>
+                  <a:schemeClr val="bg1">
+                    <a:lumMod val="75000"/>
+                  </a:schemeClr>
+                </a:solidFill>
+                <a:latin typeface="Consolas" panose="020B0609020204030204" pitchFamily="49" charset="0"/>
+                <a:cs typeface="Consolas" panose="020B0609020204030204" pitchFamily="49" charset="0"/>
+              </a:rPr>
+              <a:t>import </a:t>
+            </a:r>
+            <a:r>
+              <a:rPr lang="en-US" sz="1400" dirty="0" err="1">
+                <a:solidFill>
+                  <a:schemeClr val="bg1">
+                    <a:lumMod val="75000"/>
+                  </a:schemeClr>
+                </a:solidFill>
+                <a:latin typeface="Consolas" panose="020B0609020204030204" pitchFamily="49" charset="0"/>
+                <a:cs typeface="Consolas" panose="020B0609020204030204" pitchFamily="49" charset="0"/>
+              </a:rPr>
+              <a:t>numpy</a:t>
+            </a:r>
+            <a:r>
+              <a:rPr lang="en-US" sz="1400" dirty="0">
+                <a:solidFill>
+                  <a:schemeClr val="bg1">
+                    <a:lumMod val="75000"/>
+                  </a:schemeClr>
+                </a:solidFill>
+                <a:latin typeface="Consolas" panose="020B0609020204030204" pitchFamily="49" charset="0"/>
+                <a:cs typeface="Consolas" panose="020B0609020204030204" pitchFamily="49" charset="0"/>
+              </a:rPr>
+              <a:t> as np</a:t>
+            </a:r>
+          </a:p>
+        </p:txBody>
+      </p:sp>
     </p:spTree>
     <p:extLst>
       <p:ext uri="{BB962C8B-B14F-4D97-AF65-F5344CB8AC3E}">
-        <p14:creationId xmlns:p14="http://schemas.microsoft.com/office/powerpoint/2010/main" val="3740749817"/>
+        <p14:creationId xmlns:p14="http://schemas.microsoft.com/office/powerpoint/2010/main" val="1310907907"/>
       </p:ext>
     </p:extLst>
   </p:cSld>
@@ -6933,15 +6808,6 @@
             <a:endParaRPr lang="en-US" dirty="0"/>
           </a:p>
           <a:p>
-            <a:pPr marL="0" indent="0" algn="ctr">
-              <a:buNone/>
-            </a:pPr>
-            <a:r>
-              <a:rPr lang="en-US" b="1" dirty="0"/>
-              <a:t>What about you?</a:t>
-            </a:r>
-          </a:p>
-          <a:p>
             <a:endParaRPr lang="en-US" dirty="0"/>
           </a:p>
           <a:p>
@@ -6989,6 +6855,580 @@
     <p:extLst>
       <p:ext uri="{BB962C8B-B14F-4D97-AF65-F5344CB8AC3E}">
         <p14:creationId xmlns:p14="http://schemas.microsoft.com/office/powerpoint/2010/main" val="1608387451"/>
+      </p:ext>
+    </p:extLst>
+  </p:cSld>
+  <p:clrMapOvr>
+    <a:masterClrMapping/>
+  </p:clrMapOvr>
+</p:sld>
+</file>
+
+<file path=ppt/slides/slide20.xml><?xml version="1.0" encoding="utf-8"?>
+<p:sld xmlns:a="http://schemas.openxmlformats.org/drawingml/2006/main" xmlns:r="http://schemas.openxmlformats.org/officeDocument/2006/relationships" xmlns:p="http://schemas.openxmlformats.org/presentationml/2006/main">
+  <p:cSld>
+    <p:spTree>
+      <p:nvGrpSpPr>
+        <p:cNvPr id="1" name=""/>
+        <p:cNvGrpSpPr/>
+        <p:nvPr/>
+      </p:nvGrpSpPr>
+      <p:grpSpPr>
+        <a:xfrm>
+          <a:off x="0" y="0"/>
+          <a:ext cx="0" cy="0"/>
+          <a:chOff x="0" y="0"/>
+          <a:chExt cx="0" cy="0"/>
+        </a:xfrm>
+      </p:grpSpPr>
+      <p:sp>
+        <p:nvSpPr>
+          <p:cNvPr id="2" name="Title 1">
+            <a:extLst>
+              <a:ext uri="{FF2B5EF4-FFF2-40B4-BE49-F238E27FC236}">
+                <a16:creationId xmlns:a16="http://schemas.microsoft.com/office/drawing/2014/main" id="{C54DE36A-8036-1E6E-6118-8AAB329666E5}"/>
+              </a:ext>
+            </a:extLst>
+          </p:cNvPr>
+          <p:cNvSpPr>
+            <a:spLocks noGrp="1"/>
+          </p:cNvSpPr>
+          <p:nvPr>
+            <p:ph type="title"/>
+          </p:nvPr>
+        </p:nvSpPr>
+        <p:spPr/>
+        <p:txBody>
+          <a:bodyPr/>
+          <a:lstStyle/>
+          <a:p>
+            <a:r>
+              <a:rPr lang="en-US" dirty="0"/>
+              <a:t>Python Library - Package</a:t>
+            </a:r>
+          </a:p>
+        </p:txBody>
+      </p:sp>
+      <p:sp>
+        <p:nvSpPr>
+          <p:cNvPr id="3" name="Content Placeholder 2">
+            <a:extLst>
+              <a:ext uri="{FF2B5EF4-FFF2-40B4-BE49-F238E27FC236}">
+                <a16:creationId xmlns:a16="http://schemas.microsoft.com/office/drawing/2014/main" id="{B896F93E-986A-ADD9-B1C2-3E17CA8670C7}"/>
+              </a:ext>
+            </a:extLst>
+          </p:cNvPr>
+          <p:cNvSpPr>
+            <a:spLocks noGrp="1"/>
+          </p:cNvSpPr>
+          <p:nvPr>
+            <p:ph idx="1"/>
+          </p:nvPr>
+        </p:nvSpPr>
+        <p:spPr/>
+        <p:txBody>
+          <a:bodyPr/>
+          <a:lstStyle/>
+          <a:p>
+            <a:endParaRPr lang="en-US" dirty="0"/>
+          </a:p>
+        </p:txBody>
+      </p:sp>
+      <p:sp>
+        <p:nvSpPr>
+          <p:cNvPr id="4" name="Content Placeholder 2">
+            <a:extLst>
+              <a:ext uri="{FF2B5EF4-FFF2-40B4-BE49-F238E27FC236}">
+                <a16:creationId xmlns:a16="http://schemas.microsoft.com/office/drawing/2014/main" id="{A14BC6AA-D85D-1D20-B90D-CA59390AF393}"/>
+              </a:ext>
+            </a:extLst>
+          </p:cNvPr>
+          <p:cNvSpPr txBox="1">
+            <a:spLocks/>
+          </p:cNvSpPr>
+          <p:nvPr/>
+        </p:nvSpPr>
+        <p:spPr>
+          <a:xfrm>
+            <a:off x="695696" y="2546927"/>
+            <a:ext cx="10515600" cy="2477799"/>
+          </a:xfrm>
+          <a:prstGeom prst="rect">
+            <a:avLst/>
+          </a:prstGeom>
+        </p:spPr>
+        <p:txBody>
+          <a:bodyPr vert="horz" lIns="91440" tIns="45720" rIns="91440" bIns="45720" rtlCol="0">
+            <a:normAutofit/>
+          </a:bodyPr>
+          <a:lstStyle>
+            <a:lvl1pPr marL="228600" indent="-228600" algn="l" defTabSz="914400" rtl="0" eaLnBrk="1" latinLnBrk="0" hangingPunct="1">
+              <a:lnSpc>
+                <a:spcPct val="90000"/>
+              </a:lnSpc>
+              <a:spcBef>
+                <a:spcPts val="1000"/>
+              </a:spcBef>
+              <a:buFont typeface="Arial" panose="020B0604020202020204" pitchFamily="34" charset="0"/>
+              <a:buChar char="•"/>
+              <a:defRPr sz="2800" kern="1200">
+                <a:solidFill>
+                  <a:schemeClr val="tx1"/>
+                </a:solidFill>
+                <a:latin typeface="+mn-lt"/>
+                <a:ea typeface="+mn-ea"/>
+                <a:cs typeface="+mn-cs"/>
+              </a:defRPr>
+            </a:lvl1pPr>
+            <a:lvl2pPr marL="685800" indent="-228600" algn="l" defTabSz="914400" rtl="0" eaLnBrk="1" latinLnBrk="0" hangingPunct="1">
+              <a:lnSpc>
+                <a:spcPct val="90000"/>
+              </a:lnSpc>
+              <a:spcBef>
+                <a:spcPts val="500"/>
+              </a:spcBef>
+              <a:buFont typeface="Arial" panose="020B0604020202020204" pitchFamily="34" charset="0"/>
+              <a:buChar char="•"/>
+              <a:defRPr sz="2400" kern="1200">
+                <a:solidFill>
+                  <a:schemeClr val="tx1"/>
+                </a:solidFill>
+                <a:latin typeface="+mn-lt"/>
+                <a:ea typeface="+mn-ea"/>
+                <a:cs typeface="+mn-cs"/>
+              </a:defRPr>
+            </a:lvl2pPr>
+            <a:lvl3pPr marL="1143000" indent="-228600" algn="l" defTabSz="914400" rtl="0" eaLnBrk="1" latinLnBrk="0" hangingPunct="1">
+              <a:lnSpc>
+                <a:spcPct val="90000"/>
+              </a:lnSpc>
+              <a:spcBef>
+                <a:spcPts val="500"/>
+              </a:spcBef>
+              <a:buFont typeface="Arial" panose="020B0604020202020204" pitchFamily="34" charset="0"/>
+              <a:buChar char="•"/>
+              <a:defRPr sz="2000" kern="1200">
+                <a:solidFill>
+                  <a:schemeClr val="tx1"/>
+                </a:solidFill>
+                <a:latin typeface="+mn-lt"/>
+                <a:ea typeface="+mn-ea"/>
+                <a:cs typeface="+mn-cs"/>
+              </a:defRPr>
+            </a:lvl3pPr>
+            <a:lvl4pPr marL="1600200" indent="-228600" algn="l" defTabSz="914400" rtl="0" eaLnBrk="1" latinLnBrk="0" hangingPunct="1">
+              <a:lnSpc>
+                <a:spcPct val="90000"/>
+              </a:lnSpc>
+              <a:spcBef>
+                <a:spcPts val="500"/>
+              </a:spcBef>
+              <a:buFont typeface="Arial" panose="020B0604020202020204" pitchFamily="34" charset="0"/>
+              <a:buChar char="•"/>
+              <a:defRPr sz="1800" kern="1200">
+                <a:solidFill>
+                  <a:schemeClr val="tx1"/>
+                </a:solidFill>
+                <a:latin typeface="+mn-lt"/>
+                <a:ea typeface="+mn-ea"/>
+                <a:cs typeface="+mn-cs"/>
+              </a:defRPr>
+            </a:lvl4pPr>
+            <a:lvl5pPr marL="2057400" indent="-228600" algn="l" defTabSz="914400" rtl="0" eaLnBrk="1" latinLnBrk="0" hangingPunct="1">
+              <a:lnSpc>
+                <a:spcPct val="90000"/>
+              </a:lnSpc>
+              <a:spcBef>
+                <a:spcPts val="500"/>
+              </a:spcBef>
+              <a:buFont typeface="Arial" panose="020B0604020202020204" pitchFamily="34" charset="0"/>
+              <a:buChar char="•"/>
+              <a:defRPr sz="1800" kern="1200">
+                <a:solidFill>
+                  <a:schemeClr val="tx1"/>
+                </a:solidFill>
+                <a:latin typeface="+mn-lt"/>
+                <a:ea typeface="+mn-ea"/>
+                <a:cs typeface="+mn-cs"/>
+              </a:defRPr>
+            </a:lvl5pPr>
+            <a:lvl6pPr marL="2514600" indent="-228600" algn="l" defTabSz="914400" rtl="0" eaLnBrk="1" latinLnBrk="0" hangingPunct="1">
+              <a:lnSpc>
+                <a:spcPct val="90000"/>
+              </a:lnSpc>
+              <a:spcBef>
+                <a:spcPts val="500"/>
+              </a:spcBef>
+              <a:buFont typeface="Arial" panose="020B0604020202020204" pitchFamily="34" charset="0"/>
+              <a:buChar char="•"/>
+              <a:defRPr sz="1800" kern="1200">
+                <a:solidFill>
+                  <a:schemeClr val="tx1"/>
+                </a:solidFill>
+                <a:latin typeface="+mn-lt"/>
+                <a:ea typeface="+mn-ea"/>
+                <a:cs typeface="+mn-cs"/>
+              </a:defRPr>
+            </a:lvl6pPr>
+            <a:lvl7pPr marL="2971800" indent="-228600" algn="l" defTabSz="914400" rtl="0" eaLnBrk="1" latinLnBrk="0" hangingPunct="1">
+              <a:lnSpc>
+                <a:spcPct val="90000"/>
+              </a:lnSpc>
+              <a:spcBef>
+                <a:spcPts val="500"/>
+              </a:spcBef>
+              <a:buFont typeface="Arial" panose="020B0604020202020204" pitchFamily="34" charset="0"/>
+              <a:buChar char="•"/>
+              <a:defRPr sz="1800" kern="1200">
+                <a:solidFill>
+                  <a:schemeClr val="tx1"/>
+                </a:solidFill>
+                <a:latin typeface="+mn-lt"/>
+                <a:ea typeface="+mn-ea"/>
+                <a:cs typeface="+mn-cs"/>
+              </a:defRPr>
+            </a:lvl7pPr>
+            <a:lvl8pPr marL="3429000" indent="-228600" algn="l" defTabSz="914400" rtl="0" eaLnBrk="1" latinLnBrk="0" hangingPunct="1">
+              <a:lnSpc>
+                <a:spcPct val="90000"/>
+              </a:lnSpc>
+              <a:spcBef>
+                <a:spcPts val="500"/>
+              </a:spcBef>
+              <a:buFont typeface="Arial" panose="020B0604020202020204" pitchFamily="34" charset="0"/>
+              <a:buChar char="•"/>
+              <a:defRPr sz="1800" kern="1200">
+                <a:solidFill>
+                  <a:schemeClr val="tx1"/>
+                </a:solidFill>
+                <a:latin typeface="+mn-lt"/>
+                <a:ea typeface="+mn-ea"/>
+                <a:cs typeface="+mn-cs"/>
+              </a:defRPr>
+            </a:lvl8pPr>
+            <a:lvl9pPr marL="3886200" indent="-228600" algn="l" defTabSz="914400" rtl="0" eaLnBrk="1" latinLnBrk="0" hangingPunct="1">
+              <a:lnSpc>
+                <a:spcPct val="90000"/>
+              </a:lnSpc>
+              <a:spcBef>
+                <a:spcPts val="500"/>
+              </a:spcBef>
+              <a:buFont typeface="Arial" panose="020B0604020202020204" pitchFamily="34" charset="0"/>
+              <a:buChar char="•"/>
+              <a:defRPr sz="1800" kern="1200">
+                <a:solidFill>
+                  <a:schemeClr val="tx1"/>
+                </a:solidFill>
+                <a:latin typeface="+mn-lt"/>
+                <a:ea typeface="+mn-ea"/>
+                <a:cs typeface="+mn-cs"/>
+              </a:defRPr>
+            </a:lvl9pPr>
+          </a:lstStyle>
+          <a:p>
+            <a:pPr marL="0" indent="0" algn="ctr">
+              <a:buFont typeface="Arial" panose="020B0604020202020204" pitchFamily="34" charset="0"/>
+              <a:buNone/>
+            </a:pPr>
+            <a:r>
+              <a:rPr lang="en-US" sz="16600"/>
+              <a:t>DEMO</a:t>
+            </a:r>
+            <a:endParaRPr lang="en-US" sz="16600" dirty="0"/>
+          </a:p>
+        </p:txBody>
+      </p:sp>
+    </p:spTree>
+    <p:extLst>
+      <p:ext uri="{BB962C8B-B14F-4D97-AF65-F5344CB8AC3E}">
+        <p14:creationId xmlns:p14="http://schemas.microsoft.com/office/powerpoint/2010/main" val="468386226"/>
+      </p:ext>
+    </p:extLst>
+  </p:cSld>
+  <p:clrMapOvr>
+    <a:masterClrMapping/>
+  </p:clrMapOvr>
+</p:sld>
+</file>
+
+<file path=ppt/slides/slide21.xml><?xml version="1.0" encoding="utf-8"?>
+<p:sld xmlns:a="http://schemas.openxmlformats.org/drawingml/2006/main" xmlns:r="http://schemas.openxmlformats.org/officeDocument/2006/relationships" xmlns:p="http://schemas.openxmlformats.org/presentationml/2006/main">
+  <p:cSld>
+    <p:spTree>
+      <p:nvGrpSpPr>
+        <p:cNvPr id="1" name=""/>
+        <p:cNvGrpSpPr/>
+        <p:nvPr/>
+      </p:nvGrpSpPr>
+      <p:grpSpPr>
+        <a:xfrm>
+          <a:off x="0" y="0"/>
+          <a:ext cx="0" cy="0"/>
+          <a:chOff x="0" y="0"/>
+          <a:chExt cx="0" cy="0"/>
+        </a:xfrm>
+      </p:grpSpPr>
+      <p:sp>
+        <p:nvSpPr>
+          <p:cNvPr id="2" name="Title 1">
+            <a:extLst>
+              <a:ext uri="{FF2B5EF4-FFF2-40B4-BE49-F238E27FC236}">
+                <a16:creationId xmlns:a16="http://schemas.microsoft.com/office/drawing/2014/main" id="{C54DE36A-8036-1E6E-6118-8AAB329666E5}"/>
+              </a:ext>
+            </a:extLst>
+          </p:cNvPr>
+          <p:cNvSpPr>
+            <a:spLocks noGrp="1"/>
+          </p:cNvSpPr>
+          <p:nvPr>
+            <p:ph type="title"/>
+          </p:nvPr>
+        </p:nvSpPr>
+        <p:spPr/>
+        <p:txBody>
+          <a:bodyPr/>
+          <a:lstStyle/>
+          <a:p>
+            <a:r>
+              <a:rPr lang="en-US" dirty="0"/>
+              <a:t>Python Library - NumPy</a:t>
+            </a:r>
+          </a:p>
+        </p:txBody>
+      </p:sp>
+      <p:sp>
+        <p:nvSpPr>
+          <p:cNvPr id="3" name="Content Placeholder 2">
+            <a:extLst>
+              <a:ext uri="{FF2B5EF4-FFF2-40B4-BE49-F238E27FC236}">
+                <a16:creationId xmlns:a16="http://schemas.microsoft.com/office/drawing/2014/main" id="{B896F93E-986A-ADD9-B1C2-3E17CA8670C7}"/>
+              </a:ext>
+            </a:extLst>
+          </p:cNvPr>
+          <p:cNvSpPr>
+            <a:spLocks noGrp="1"/>
+          </p:cNvSpPr>
+          <p:nvPr>
+            <p:ph idx="1"/>
+          </p:nvPr>
+        </p:nvSpPr>
+        <p:spPr/>
+        <p:txBody>
+          <a:bodyPr/>
+          <a:lstStyle/>
+          <a:p>
+            <a:endParaRPr lang="en-US" dirty="0"/>
+          </a:p>
+        </p:txBody>
+      </p:sp>
+      <p:sp>
+        <p:nvSpPr>
+          <p:cNvPr id="4" name="Content Placeholder 2">
+            <a:extLst>
+              <a:ext uri="{FF2B5EF4-FFF2-40B4-BE49-F238E27FC236}">
+                <a16:creationId xmlns:a16="http://schemas.microsoft.com/office/drawing/2014/main" id="{A14BC6AA-D85D-1D20-B90D-CA59390AF393}"/>
+              </a:ext>
+            </a:extLst>
+          </p:cNvPr>
+          <p:cNvSpPr txBox="1">
+            <a:spLocks/>
+          </p:cNvSpPr>
+          <p:nvPr/>
+        </p:nvSpPr>
+        <p:spPr>
+          <a:xfrm>
+            <a:off x="695696" y="2546927"/>
+            <a:ext cx="10515600" cy="2477799"/>
+          </a:xfrm>
+          <a:prstGeom prst="rect">
+            <a:avLst/>
+          </a:prstGeom>
+        </p:spPr>
+        <p:txBody>
+          <a:bodyPr vert="horz" lIns="91440" tIns="45720" rIns="91440" bIns="45720" rtlCol="0">
+            <a:normAutofit/>
+          </a:bodyPr>
+          <a:lstStyle>
+            <a:lvl1pPr marL="228600" indent="-228600" algn="l" defTabSz="914400" rtl="0" eaLnBrk="1" latinLnBrk="0" hangingPunct="1">
+              <a:lnSpc>
+                <a:spcPct val="90000"/>
+              </a:lnSpc>
+              <a:spcBef>
+                <a:spcPts val="1000"/>
+              </a:spcBef>
+              <a:buFont typeface="Arial" panose="020B0604020202020204" pitchFamily="34" charset="0"/>
+              <a:buChar char="•"/>
+              <a:defRPr sz="2800" kern="1200">
+                <a:solidFill>
+                  <a:schemeClr val="tx1"/>
+                </a:solidFill>
+                <a:latin typeface="+mn-lt"/>
+                <a:ea typeface="+mn-ea"/>
+                <a:cs typeface="+mn-cs"/>
+              </a:defRPr>
+            </a:lvl1pPr>
+            <a:lvl2pPr marL="685800" indent="-228600" algn="l" defTabSz="914400" rtl="0" eaLnBrk="1" latinLnBrk="0" hangingPunct="1">
+              <a:lnSpc>
+                <a:spcPct val="90000"/>
+              </a:lnSpc>
+              <a:spcBef>
+                <a:spcPts val="500"/>
+              </a:spcBef>
+              <a:buFont typeface="Arial" panose="020B0604020202020204" pitchFamily="34" charset="0"/>
+              <a:buChar char="•"/>
+              <a:defRPr sz="2400" kern="1200">
+                <a:solidFill>
+                  <a:schemeClr val="tx1"/>
+                </a:solidFill>
+                <a:latin typeface="+mn-lt"/>
+                <a:ea typeface="+mn-ea"/>
+                <a:cs typeface="+mn-cs"/>
+              </a:defRPr>
+            </a:lvl2pPr>
+            <a:lvl3pPr marL="1143000" indent="-228600" algn="l" defTabSz="914400" rtl="0" eaLnBrk="1" latinLnBrk="0" hangingPunct="1">
+              <a:lnSpc>
+                <a:spcPct val="90000"/>
+              </a:lnSpc>
+              <a:spcBef>
+                <a:spcPts val="500"/>
+              </a:spcBef>
+              <a:buFont typeface="Arial" panose="020B0604020202020204" pitchFamily="34" charset="0"/>
+              <a:buChar char="•"/>
+              <a:defRPr sz="2000" kern="1200">
+                <a:solidFill>
+                  <a:schemeClr val="tx1"/>
+                </a:solidFill>
+                <a:latin typeface="+mn-lt"/>
+                <a:ea typeface="+mn-ea"/>
+                <a:cs typeface="+mn-cs"/>
+              </a:defRPr>
+            </a:lvl3pPr>
+            <a:lvl4pPr marL="1600200" indent="-228600" algn="l" defTabSz="914400" rtl="0" eaLnBrk="1" latinLnBrk="0" hangingPunct="1">
+              <a:lnSpc>
+                <a:spcPct val="90000"/>
+              </a:lnSpc>
+              <a:spcBef>
+                <a:spcPts val="500"/>
+              </a:spcBef>
+              <a:buFont typeface="Arial" panose="020B0604020202020204" pitchFamily="34" charset="0"/>
+              <a:buChar char="•"/>
+              <a:defRPr sz="1800" kern="1200">
+                <a:solidFill>
+                  <a:schemeClr val="tx1"/>
+                </a:solidFill>
+                <a:latin typeface="+mn-lt"/>
+                <a:ea typeface="+mn-ea"/>
+                <a:cs typeface="+mn-cs"/>
+              </a:defRPr>
+            </a:lvl4pPr>
+            <a:lvl5pPr marL="2057400" indent="-228600" algn="l" defTabSz="914400" rtl="0" eaLnBrk="1" latinLnBrk="0" hangingPunct="1">
+              <a:lnSpc>
+                <a:spcPct val="90000"/>
+              </a:lnSpc>
+              <a:spcBef>
+                <a:spcPts val="500"/>
+              </a:spcBef>
+              <a:buFont typeface="Arial" panose="020B0604020202020204" pitchFamily="34" charset="0"/>
+              <a:buChar char="•"/>
+              <a:defRPr sz="1800" kern="1200">
+                <a:solidFill>
+                  <a:schemeClr val="tx1"/>
+                </a:solidFill>
+                <a:latin typeface="+mn-lt"/>
+                <a:ea typeface="+mn-ea"/>
+                <a:cs typeface="+mn-cs"/>
+              </a:defRPr>
+            </a:lvl5pPr>
+            <a:lvl6pPr marL="2514600" indent="-228600" algn="l" defTabSz="914400" rtl="0" eaLnBrk="1" latinLnBrk="0" hangingPunct="1">
+              <a:lnSpc>
+                <a:spcPct val="90000"/>
+              </a:lnSpc>
+              <a:spcBef>
+                <a:spcPts val="500"/>
+              </a:spcBef>
+              <a:buFont typeface="Arial" panose="020B0604020202020204" pitchFamily="34" charset="0"/>
+              <a:buChar char="•"/>
+              <a:defRPr sz="1800" kern="1200">
+                <a:solidFill>
+                  <a:schemeClr val="tx1"/>
+                </a:solidFill>
+                <a:latin typeface="+mn-lt"/>
+                <a:ea typeface="+mn-ea"/>
+                <a:cs typeface="+mn-cs"/>
+              </a:defRPr>
+            </a:lvl6pPr>
+            <a:lvl7pPr marL="2971800" indent="-228600" algn="l" defTabSz="914400" rtl="0" eaLnBrk="1" latinLnBrk="0" hangingPunct="1">
+              <a:lnSpc>
+                <a:spcPct val="90000"/>
+              </a:lnSpc>
+              <a:spcBef>
+                <a:spcPts val="500"/>
+              </a:spcBef>
+              <a:buFont typeface="Arial" panose="020B0604020202020204" pitchFamily="34" charset="0"/>
+              <a:buChar char="•"/>
+              <a:defRPr sz="1800" kern="1200">
+                <a:solidFill>
+                  <a:schemeClr val="tx1"/>
+                </a:solidFill>
+                <a:latin typeface="+mn-lt"/>
+                <a:ea typeface="+mn-ea"/>
+                <a:cs typeface="+mn-cs"/>
+              </a:defRPr>
+            </a:lvl7pPr>
+            <a:lvl8pPr marL="3429000" indent="-228600" algn="l" defTabSz="914400" rtl="0" eaLnBrk="1" latinLnBrk="0" hangingPunct="1">
+              <a:lnSpc>
+                <a:spcPct val="90000"/>
+              </a:lnSpc>
+              <a:spcBef>
+                <a:spcPts val="500"/>
+              </a:spcBef>
+              <a:buFont typeface="Arial" panose="020B0604020202020204" pitchFamily="34" charset="0"/>
+              <a:buChar char="•"/>
+              <a:defRPr sz="1800" kern="1200">
+                <a:solidFill>
+                  <a:schemeClr val="tx1"/>
+                </a:solidFill>
+                <a:latin typeface="+mn-lt"/>
+                <a:ea typeface="+mn-ea"/>
+                <a:cs typeface="+mn-cs"/>
+              </a:defRPr>
+            </a:lvl8pPr>
+            <a:lvl9pPr marL="3886200" indent="-228600" algn="l" defTabSz="914400" rtl="0" eaLnBrk="1" latinLnBrk="0" hangingPunct="1">
+              <a:lnSpc>
+                <a:spcPct val="90000"/>
+              </a:lnSpc>
+              <a:spcBef>
+                <a:spcPts val="500"/>
+              </a:spcBef>
+              <a:buFont typeface="Arial" panose="020B0604020202020204" pitchFamily="34" charset="0"/>
+              <a:buChar char="•"/>
+              <a:defRPr sz="1800" kern="1200">
+                <a:solidFill>
+                  <a:schemeClr val="tx1"/>
+                </a:solidFill>
+                <a:latin typeface="+mn-lt"/>
+                <a:ea typeface="+mn-ea"/>
+                <a:cs typeface="+mn-cs"/>
+              </a:defRPr>
+            </a:lvl9pPr>
+          </a:lstStyle>
+          <a:p>
+            <a:pPr marL="0" indent="0" algn="ctr">
+              <a:buFont typeface="Arial" panose="020B0604020202020204" pitchFamily="34" charset="0"/>
+              <a:buNone/>
+            </a:pPr>
+            <a:r>
+              <a:rPr lang="en-US" sz="16600"/>
+              <a:t>DEMO</a:t>
+            </a:r>
+            <a:endParaRPr lang="en-US" sz="16600" dirty="0"/>
+          </a:p>
+        </p:txBody>
+      </p:sp>
+    </p:spTree>
+    <p:extLst>
+      <p:ext uri="{BB962C8B-B14F-4D97-AF65-F5344CB8AC3E}">
+        <p14:creationId xmlns:p14="http://schemas.microsoft.com/office/powerpoint/2010/main" val="442354909"/>
       </p:ext>
     </p:extLst>
   </p:cSld>
@@ -7996,8 +8436,16 @@
           <a:p>
             <a:r>
               <a:rPr lang="en-US" dirty="0"/>
-              <a:t>Installing Python</a:t>
-            </a:r>
+              <a:t>Installing Python:</a:t>
+            </a:r>
+            <a:br>
+              <a:rPr lang="en-US" dirty="0"/>
+            </a:br>
+            <a:r>
+              <a:rPr lang="en-US" dirty="0" err="1"/>
+              <a:t>www.python.org</a:t>
+            </a:r>
+            <a:endParaRPr lang="en-US" dirty="0"/>
           </a:p>
         </p:txBody>
       </p:sp>

</xml_diff>

<commit_message>
update day 1 presentation
</commit_message>
<xml_diff>
--- a/day_1/day_1.pptx
+++ b/day_1/day_1.pptx
@@ -279,7 +279,7 @@
           <a:p>
             <a:fld id="{B379E729-857E-4B18-8CDF-E57BD210DF26}" type="datetimeFigureOut">
               <a:rPr lang="en-US" smtClean="0"/>
-              <a:t>10/22/23</a:t>
+              <a:t>10/23/23</a:t>
             </a:fld>
             <a:endParaRPr lang="en-US"/>
           </a:p>
@@ -477,7 +477,7 @@
           <a:p>
             <a:fld id="{B379E729-857E-4B18-8CDF-E57BD210DF26}" type="datetimeFigureOut">
               <a:rPr lang="en-US" smtClean="0"/>
-              <a:t>10/22/23</a:t>
+              <a:t>10/23/23</a:t>
             </a:fld>
             <a:endParaRPr lang="en-US"/>
           </a:p>
@@ -685,7 +685,7 @@
           <a:p>
             <a:fld id="{B379E729-857E-4B18-8CDF-E57BD210DF26}" type="datetimeFigureOut">
               <a:rPr lang="en-US" smtClean="0"/>
-              <a:t>10/22/23</a:t>
+              <a:t>10/23/23</a:t>
             </a:fld>
             <a:endParaRPr lang="en-US"/>
           </a:p>
@@ -883,7 +883,7 @@
           <a:p>
             <a:fld id="{B379E729-857E-4B18-8CDF-E57BD210DF26}" type="datetimeFigureOut">
               <a:rPr lang="en-US" smtClean="0"/>
-              <a:t>10/22/23</a:t>
+              <a:t>10/23/23</a:t>
             </a:fld>
             <a:endParaRPr lang="en-US"/>
           </a:p>
@@ -1158,7 +1158,7 @@
           <a:p>
             <a:fld id="{B379E729-857E-4B18-8CDF-E57BD210DF26}" type="datetimeFigureOut">
               <a:rPr lang="en-US" smtClean="0"/>
-              <a:t>10/22/23</a:t>
+              <a:t>10/23/23</a:t>
             </a:fld>
             <a:endParaRPr lang="en-US"/>
           </a:p>
@@ -1423,7 +1423,7 @@
           <a:p>
             <a:fld id="{B379E729-857E-4B18-8CDF-E57BD210DF26}" type="datetimeFigureOut">
               <a:rPr lang="en-US" smtClean="0"/>
-              <a:t>10/22/23</a:t>
+              <a:t>10/23/23</a:t>
             </a:fld>
             <a:endParaRPr lang="en-US"/>
           </a:p>
@@ -1835,7 +1835,7 @@
           <a:p>
             <a:fld id="{B379E729-857E-4B18-8CDF-E57BD210DF26}" type="datetimeFigureOut">
               <a:rPr lang="en-US" smtClean="0"/>
-              <a:t>10/22/23</a:t>
+              <a:t>10/23/23</a:t>
             </a:fld>
             <a:endParaRPr lang="en-US"/>
           </a:p>
@@ -1976,7 +1976,7 @@
           <a:p>
             <a:fld id="{B379E729-857E-4B18-8CDF-E57BD210DF26}" type="datetimeFigureOut">
               <a:rPr lang="en-US" smtClean="0"/>
-              <a:t>10/22/23</a:t>
+              <a:t>10/23/23</a:t>
             </a:fld>
             <a:endParaRPr lang="en-US"/>
           </a:p>
@@ -2089,7 +2089,7 @@
           <a:p>
             <a:fld id="{B379E729-857E-4B18-8CDF-E57BD210DF26}" type="datetimeFigureOut">
               <a:rPr lang="en-US" smtClean="0"/>
-              <a:t>10/22/23</a:t>
+              <a:t>10/23/23</a:t>
             </a:fld>
             <a:endParaRPr lang="en-US"/>
           </a:p>
@@ -2400,7 +2400,7 @@
           <a:p>
             <a:fld id="{B379E729-857E-4B18-8CDF-E57BD210DF26}" type="datetimeFigureOut">
               <a:rPr lang="en-US" smtClean="0"/>
-              <a:t>10/22/23</a:t>
+              <a:t>10/23/23</a:t>
             </a:fld>
             <a:endParaRPr lang="en-US"/>
           </a:p>
@@ -2688,7 +2688,7 @@
           <a:p>
             <a:fld id="{B379E729-857E-4B18-8CDF-E57BD210DF26}" type="datetimeFigureOut">
               <a:rPr lang="en-US" smtClean="0"/>
-              <a:t>10/22/23</a:t>
+              <a:t>10/23/23</a:t>
             </a:fld>
             <a:endParaRPr lang="en-US"/>
           </a:p>
@@ -2929,7 +2929,7 @@
           <a:p>
             <a:fld id="{B379E729-857E-4B18-8CDF-E57BD210DF26}" type="datetimeFigureOut">
               <a:rPr lang="en-US" smtClean="0"/>
-              <a:t>10/22/23</a:t>
+              <a:t>10/23/23</a:t>
             </a:fld>
             <a:endParaRPr lang="en-US"/>
           </a:p>
@@ -5783,6 +5783,46 @@
               <a:t>and debug the file you want to debug</a:t>
             </a:r>
           </a:p>
+          <a:p>
+            <a:endParaRPr lang="en-US" dirty="0"/>
+          </a:p>
+          <a:p>
+            <a:r>
+              <a:rPr lang="en-US" b="1" dirty="0"/>
+              <a:t>On Windows:</a:t>
+            </a:r>
+            <a:r>
+              <a:rPr lang="en-US" dirty="0"/>
+              <a:t> Make sure terminal config is set to “</a:t>
+            </a:r>
+            <a:r>
+              <a:rPr lang="en-US" dirty="0" err="1"/>
+              <a:t>cmd</a:t>
+            </a:r>
+            <a:r>
+              <a:rPr lang="en-US" dirty="0"/>
+              <a:t>”:</a:t>
+            </a:r>
+            <a:br>
+              <a:rPr lang="en-US" dirty="0"/>
+            </a:br>
+            <a:r>
+              <a:rPr lang="en-US" dirty="0"/>
+              <a:t>File -&gt; Settings -&gt; Tools -&gt; Terminal -&gt; Shell path:</a:t>
+            </a:r>
+            <a:br>
+              <a:rPr lang="en-US" dirty="0"/>
+            </a:br>
+            <a:r>
+              <a:rPr lang="en-US" dirty="0"/>
+              <a:t>C:\Windows\system32\</a:t>
+            </a:r>
+            <a:r>
+              <a:rPr lang="en-US" dirty="0" err="1"/>
+              <a:t>cmd.exe</a:t>
+            </a:r>
+            <a:endParaRPr lang="en-US" b="1" dirty="0"/>
+          </a:p>
         </p:txBody>
       </p:sp>
     </p:spTree>

</xml_diff>